<commit_message>
[tma] add all figures
</commit_message>
<xml_diff>
--- a/blogs/cute_tma/figures.pptx
+++ b/blogs/cute_tma/figures.pptx
@@ -6,6 +6,8 @@
   </p:sldMasterIdLst>
   <p:sldIdLst>
     <p:sldId id="256" r:id="rId2"/>
+    <p:sldId id="257" r:id="rId3"/>
+    <p:sldId id="258" r:id="rId4"/>
   </p:sldIdLst>
   <p:sldSz cx="12192000" cy="6858000"/>
   <p:notesSz cx="6858000" cy="9144000"/>
@@ -104,6 +106,11 @@
       </a:defRPr>
     </a:lvl9pPr>
   </p:defaultTextStyle>
+  <p:extLst>
+    <p:ext uri="{EFAFB233-063F-42B5-8137-9DF3F51BA10A}">
+      <p15:sldGuideLst xmlns:p15="http://schemas.microsoft.com/office/powerpoint/2012/main"/>
+    </p:ext>
+  </p:extLst>
 </p:presentation>
 </file>
 
@@ -4504,6 +4511,4739 @@
     <p:extLst>
       <p:ext uri="{BB962C8B-B14F-4D97-AF65-F5344CB8AC3E}">
         <p14:creationId xmlns:p14="http://schemas.microsoft.com/office/powerpoint/2010/main" val="1913499402"/>
+      </p:ext>
+    </p:extLst>
+  </p:cSld>
+  <p:clrMapOvr>
+    <a:masterClrMapping/>
+  </p:clrMapOvr>
+</p:sld>
+</file>
+
+<file path=ppt/slides/slide2.xml><?xml version="1.0" encoding="utf-8"?>
+<p:sld xmlns:a="http://schemas.openxmlformats.org/drawingml/2006/main" xmlns:r="http://schemas.openxmlformats.org/officeDocument/2006/relationships" xmlns:p="http://schemas.openxmlformats.org/presentationml/2006/main">
+  <p:cSld>
+    <p:spTree>
+      <p:nvGrpSpPr>
+        <p:cNvPr id="1" name=""/>
+        <p:cNvGrpSpPr/>
+        <p:nvPr/>
+      </p:nvGrpSpPr>
+      <p:grpSpPr>
+        <a:xfrm>
+          <a:off x="0" y="0"/>
+          <a:ext cx="0" cy="0"/>
+          <a:chOff x="0" y="0"/>
+          <a:chExt cx="0" cy="0"/>
+        </a:xfrm>
+      </p:grpSpPr>
+      <p:graphicFrame>
+        <p:nvGraphicFramePr>
+          <p:cNvPr id="2" name="表格 1">
+            <a:extLst>
+              <a:ext uri="{FF2B5EF4-FFF2-40B4-BE49-F238E27FC236}">
+                <a16:creationId xmlns:a16="http://schemas.microsoft.com/office/drawing/2014/main" id="{D7C75FF9-2385-8DD7-7C15-8DC93FC01AD8}"/>
+              </a:ext>
+            </a:extLst>
+          </p:cNvPr>
+          <p:cNvGraphicFramePr>
+            <a:graphicFrameLocks noGrp="1"/>
+          </p:cNvGraphicFramePr>
+          <p:nvPr>
+            <p:extLst>
+              <p:ext uri="{D42A27DB-BD31-4B8C-83A1-F6EECF244321}">
+                <p14:modId xmlns:p14="http://schemas.microsoft.com/office/powerpoint/2010/main" val="707915328"/>
+              </p:ext>
+            </p:extLst>
+          </p:nvPr>
+        </p:nvGraphicFramePr>
+        <p:xfrm>
+          <a:off x="2278490" y="1379624"/>
+          <a:ext cx="2880000" cy="2194560"/>
+        </p:xfrm>
+        <a:graphic>
+          <a:graphicData uri="http://schemas.openxmlformats.org/drawingml/2006/table">
+            <a:tbl>
+              <a:tblPr firstRow="1" bandRow="1">
+                <a:tableStyleId>{5940675A-B579-460E-94D1-54222C63F5DA}</a:tableStyleId>
+              </a:tblPr>
+              <a:tblGrid>
+                <a:gridCol w="360000">
+                  <a:extLst>
+                    <a:ext uri="{9D8B030D-6E8A-4147-A177-3AD203B41FA5}">
+                      <a16:colId xmlns:a16="http://schemas.microsoft.com/office/drawing/2014/main" val="2034969248"/>
+                    </a:ext>
+                  </a:extLst>
+                </a:gridCol>
+                <a:gridCol w="360000">
+                  <a:extLst>
+                    <a:ext uri="{9D8B030D-6E8A-4147-A177-3AD203B41FA5}">
+                      <a16:colId xmlns:a16="http://schemas.microsoft.com/office/drawing/2014/main" val="4259093849"/>
+                    </a:ext>
+                  </a:extLst>
+                </a:gridCol>
+                <a:gridCol w="360000">
+                  <a:extLst>
+                    <a:ext uri="{9D8B030D-6E8A-4147-A177-3AD203B41FA5}">
+                      <a16:colId xmlns:a16="http://schemas.microsoft.com/office/drawing/2014/main" val="1669695598"/>
+                    </a:ext>
+                  </a:extLst>
+                </a:gridCol>
+                <a:gridCol w="360000">
+                  <a:extLst>
+                    <a:ext uri="{9D8B030D-6E8A-4147-A177-3AD203B41FA5}">
+                      <a16:colId xmlns:a16="http://schemas.microsoft.com/office/drawing/2014/main" val="3881258515"/>
+                    </a:ext>
+                  </a:extLst>
+                </a:gridCol>
+                <a:gridCol w="360000">
+                  <a:extLst>
+                    <a:ext uri="{9D8B030D-6E8A-4147-A177-3AD203B41FA5}">
+                      <a16:colId xmlns:a16="http://schemas.microsoft.com/office/drawing/2014/main" val="362548930"/>
+                    </a:ext>
+                  </a:extLst>
+                </a:gridCol>
+                <a:gridCol w="360000">
+                  <a:extLst>
+                    <a:ext uri="{9D8B030D-6E8A-4147-A177-3AD203B41FA5}">
+                      <a16:colId xmlns:a16="http://schemas.microsoft.com/office/drawing/2014/main" val="2625984587"/>
+                    </a:ext>
+                  </a:extLst>
+                </a:gridCol>
+                <a:gridCol w="360000">
+                  <a:extLst>
+                    <a:ext uri="{9D8B030D-6E8A-4147-A177-3AD203B41FA5}">
+                      <a16:colId xmlns:a16="http://schemas.microsoft.com/office/drawing/2014/main" val="3336674363"/>
+                    </a:ext>
+                  </a:extLst>
+                </a:gridCol>
+                <a:gridCol w="360000">
+                  <a:extLst>
+                    <a:ext uri="{9D8B030D-6E8A-4147-A177-3AD203B41FA5}">
+                      <a16:colId xmlns:a16="http://schemas.microsoft.com/office/drawing/2014/main" val="3089910086"/>
+                    </a:ext>
+                  </a:extLst>
+                </a:gridCol>
+              </a:tblGrid>
+              <a:tr h="360000">
+                <a:tc>
+                  <a:txBody>
+                    <a:bodyPr/>
+                    <a:lstStyle/>
+                    <a:p>
+                      <a:endParaRPr lang="en-US" dirty="0"/>
+                    </a:p>
+                  </a:txBody>
+                  <a:tcPr>
+                    <a:solidFill>
+                      <a:schemeClr val="accent2">
+                        <a:lumMod val="40000"/>
+                        <a:lumOff val="60000"/>
+                      </a:schemeClr>
+                    </a:solidFill>
+                  </a:tcPr>
+                </a:tc>
+                <a:tc>
+                  <a:txBody>
+                    <a:bodyPr/>
+                    <a:lstStyle/>
+                    <a:p>
+                      <a:endParaRPr lang="en-US" dirty="0"/>
+                    </a:p>
+                  </a:txBody>
+                  <a:tcPr>
+                    <a:solidFill>
+                      <a:schemeClr val="accent2">
+                        <a:lumMod val="40000"/>
+                        <a:lumOff val="60000"/>
+                      </a:schemeClr>
+                    </a:solidFill>
+                  </a:tcPr>
+                </a:tc>
+                <a:tc>
+                  <a:txBody>
+                    <a:bodyPr/>
+                    <a:lstStyle/>
+                    <a:p>
+                      <a:endParaRPr lang="en-US" dirty="0"/>
+                    </a:p>
+                  </a:txBody>
+                  <a:tcPr>
+                    <a:solidFill>
+                      <a:schemeClr val="accent2">
+                        <a:lumMod val="40000"/>
+                        <a:lumOff val="60000"/>
+                      </a:schemeClr>
+                    </a:solidFill>
+                  </a:tcPr>
+                </a:tc>
+                <a:tc>
+                  <a:txBody>
+                    <a:bodyPr/>
+                    <a:lstStyle/>
+                    <a:p>
+                      <a:endParaRPr lang="en-US"/>
+                    </a:p>
+                  </a:txBody>
+                  <a:tcPr>
+                    <a:solidFill>
+                      <a:schemeClr val="accent2">
+                        <a:lumMod val="40000"/>
+                        <a:lumOff val="60000"/>
+                      </a:schemeClr>
+                    </a:solidFill>
+                  </a:tcPr>
+                </a:tc>
+                <a:tc>
+                  <a:txBody>
+                    <a:bodyPr/>
+                    <a:lstStyle/>
+                    <a:p>
+                      <a:endParaRPr lang="en-US" dirty="0"/>
+                    </a:p>
+                  </a:txBody>
+                  <a:tcPr>
+                    <a:solidFill>
+                      <a:schemeClr val="accent6">
+                        <a:lumMod val="40000"/>
+                        <a:lumOff val="60000"/>
+                      </a:schemeClr>
+                    </a:solidFill>
+                  </a:tcPr>
+                </a:tc>
+                <a:tc>
+                  <a:txBody>
+                    <a:bodyPr/>
+                    <a:lstStyle/>
+                    <a:p>
+                      <a:endParaRPr lang="en-US" dirty="0"/>
+                    </a:p>
+                  </a:txBody>
+                  <a:tcPr>
+                    <a:solidFill>
+                      <a:schemeClr val="accent6">
+                        <a:lumMod val="40000"/>
+                        <a:lumOff val="60000"/>
+                      </a:schemeClr>
+                    </a:solidFill>
+                  </a:tcPr>
+                </a:tc>
+                <a:tc>
+                  <a:txBody>
+                    <a:bodyPr/>
+                    <a:lstStyle/>
+                    <a:p>
+                      <a:endParaRPr lang="en-US" dirty="0"/>
+                    </a:p>
+                  </a:txBody>
+                  <a:tcPr>
+                    <a:solidFill>
+                      <a:schemeClr val="accent6">
+                        <a:lumMod val="40000"/>
+                        <a:lumOff val="60000"/>
+                      </a:schemeClr>
+                    </a:solidFill>
+                  </a:tcPr>
+                </a:tc>
+                <a:tc>
+                  <a:txBody>
+                    <a:bodyPr/>
+                    <a:lstStyle/>
+                    <a:p>
+                      <a:endParaRPr lang="en-US" dirty="0"/>
+                    </a:p>
+                  </a:txBody>
+                  <a:tcPr>
+                    <a:solidFill>
+                      <a:schemeClr val="accent6">
+                        <a:lumMod val="40000"/>
+                        <a:lumOff val="60000"/>
+                      </a:schemeClr>
+                    </a:solidFill>
+                  </a:tcPr>
+                </a:tc>
+                <a:extLst>
+                  <a:ext uri="{0D108BD9-81ED-4DB2-BD59-A6C34878D82A}">
+                    <a16:rowId xmlns:a16="http://schemas.microsoft.com/office/drawing/2014/main" val="1340743427"/>
+                  </a:ext>
+                </a:extLst>
+              </a:tr>
+              <a:tr h="360000">
+                <a:tc>
+                  <a:txBody>
+                    <a:bodyPr/>
+                    <a:lstStyle/>
+                    <a:p>
+                      <a:endParaRPr lang="en-US"/>
+                    </a:p>
+                  </a:txBody>
+                  <a:tcPr>
+                    <a:solidFill>
+                      <a:schemeClr val="accent2">
+                        <a:lumMod val="40000"/>
+                        <a:lumOff val="60000"/>
+                      </a:schemeClr>
+                    </a:solidFill>
+                  </a:tcPr>
+                </a:tc>
+                <a:tc>
+                  <a:txBody>
+                    <a:bodyPr/>
+                    <a:lstStyle/>
+                    <a:p>
+                      <a:endParaRPr lang="en-US"/>
+                    </a:p>
+                  </a:txBody>
+                  <a:tcPr>
+                    <a:solidFill>
+                      <a:schemeClr val="accent2">
+                        <a:lumMod val="40000"/>
+                        <a:lumOff val="60000"/>
+                      </a:schemeClr>
+                    </a:solidFill>
+                  </a:tcPr>
+                </a:tc>
+                <a:tc>
+                  <a:txBody>
+                    <a:bodyPr/>
+                    <a:lstStyle/>
+                    <a:p>
+                      <a:endParaRPr lang="en-US" dirty="0"/>
+                    </a:p>
+                  </a:txBody>
+                  <a:tcPr>
+                    <a:solidFill>
+                      <a:schemeClr val="accent2">
+                        <a:lumMod val="40000"/>
+                        <a:lumOff val="60000"/>
+                      </a:schemeClr>
+                    </a:solidFill>
+                  </a:tcPr>
+                </a:tc>
+                <a:tc>
+                  <a:txBody>
+                    <a:bodyPr/>
+                    <a:lstStyle/>
+                    <a:p>
+                      <a:endParaRPr lang="en-US" dirty="0"/>
+                    </a:p>
+                  </a:txBody>
+                  <a:tcPr>
+                    <a:solidFill>
+                      <a:schemeClr val="accent2">
+                        <a:lumMod val="40000"/>
+                        <a:lumOff val="60000"/>
+                      </a:schemeClr>
+                    </a:solidFill>
+                  </a:tcPr>
+                </a:tc>
+                <a:tc>
+                  <a:txBody>
+                    <a:bodyPr/>
+                    <a:lstStyle/>
+                    <a:p>
+                      <a:endParaRPr lang="en-US"/>
+                    </a:p>
+                  </a:txBody>
+                  <a:tcPr>
+                    <a:solidFill>
+                      <a:schemeClr val="accent6">
+                        <a:lumMod val="40000"/>
+                        <a:lumOff val="60000"/>
+                      </a:schemeClr>
+                    </a:solidFill>
+                  </a:tcPr>
+                </a:tc>
+                <a:tc>
+                  <a:txBody>
+                    <a:bodyPr/>
+                    <a:lstStyle/>
+                    <a:p>
+                      <a:endParaRPr lang="en-US"/>
+                    </a:p>
+                  </a:txBody>
+                  <a:tcPr>
+                    <a:solidFill>
+                      <a:schemeClr val="accent6">
+                        <a:lumMod val="40000"/>
+                        <a:lumOff val="60000"/>
+                      </a:schemeClr>
+                    </a:solidFill>
+                  </a:tcPr>
+                </a:tc>
+                <a:tc>
+                  <a:txBody>
+                    <a:bodyPr/>
+                    <a:lstStyle/>
+                    <a:p>
+                      <a:endParaRPr lang="en-US" dirty="0"/>
+                    </a:p>
+                  </a:txBody>
+                  <a:tcPr>
+                    <a:solidFill>
+                      <a:schemeClr val="accent6">
+                        <a:lumMod val="40000"/>
+                        <a:lumOff val="60000"/>
+                      </a:schemeClr>
+                    </a:solidFill>
+                  </a:tcPr>
+                </a:tc>
+                <a:tc>
+                  <a:txBody>
+                    <a:bodyPr/>
+                    <a:lstStyle/>
+                    <a:p>
+                      <a:endParaRPr lang="en-US" dirty="0"/>
+                    </a:p>
+                  </a:txBody>
+                  <a:tcPr>
+                    <a:solidFill>
+                      <a:schemeClr val="accent6">
+                        <a:lumMod val="40000"/>
+                        <a:lumOff val="60000"/>
+                      </a:schemeClr>
+                    </a:solidFill>
+                  </a:tcPr>
+                </a:tc>
+                <a:extLst>
+                  <a:ext uri="{0D108BD9-81ED-4DB2-BD59-A6C34878D82A}">
+                    <a16:rowId xmlns:a16="http://schemas.microsoft.com/office/drawing/2014/main" val="4081798692"/>
+                  </a:ext>
+                </a:extLst>
+              </a:tr>
+              <a:tr h="360000">
+                <a:tc>
+                  <a:txBody>
+                    <a:bodyPr/>
+                    <a:lstStyle/>
+                    <a:p>
+                      <a:endParaRPr lang="en-US" dirty="0"/>
+                    </a:p>
+                  </a:txBody>
+                  <a:tcPr>
+                    <a:solidFill>
+                      <a:schemeClr val="accent6">
+                        <a:lumMod val="40000"/>
+                        <a:lumOff val="60000"/>
+                      </a:schemeClr>
+                    </a:solidFill>
+                  </a:tcPr>
+                </a:tc>
+                <a:tc>
+                  <a:txBody>
+                    <a:bodyPr/>
+                    <a:lstStyle/>
+                    <a:p>
+                      <a:endParaRPr lang="en-US" dirty="0"/>
+                    </a:p>
+                  </a:txBody>
+                  <a:tcPr>
+                    <a:solidFill>
+                      <a:schemeClr val="accent6">
+                        <a:lumMod val="40000"/>
+                        <a:lumOff val="60000"/>
+                      </a:schemeClr>
+                    </a:solidFill>
+                  </a:tcPr>
+                </a:tc>
+                <a:tc>
+                  <a:txBody>
+                    <a:bodyPr/>
+                    <a:lstStyle/>
+                    <a:p>
+                      <a:endParaRPr lang="en-US"/>
+                    </a:p>
+                  </a:txBody>
+                  <a:tcPr>
+                    <a:solidFill>
+                      <a:schemeClr val="accent6">
+                        <a:lumMod val="40000"/>
+                        <a:lumOff val="60000"/>
+                      </a:schemeClr>
+                    </a:solidFill>
+                  </a:tcPr>
+                </a:tc>
+                <a:tc>
+                  <a:txBody>
+                    <a:bodyPr/>
+                    <a:lstStyle/>
+                    <a:p>
+                      <a:endParaRPr lang="en-US"/>
+                    </a:p>
+                  </a:txBody>
+                  <a:tcPr>
+                    <a:solidFill>
+                      <a:schemeClr val="accent6">
+                        <a:lumMod val="40000"/>
+                        <a:lumOff val="60000"/>
+                      </a:schemeClr>
+                    </a:solidFill>
+                  </a:tcPr>
+                </a:tc>
+                <a:tc>
+                  <a:txBody>
+                    <a:bodyPr/>
+                    <a:lstStyle/>
+                    <a:p>
+                      <a:endParaRPr lang="en-US"/>
+                    </a:p>
+                  </a:txBody>
+                  <a:tcPr>
+                    <a:solidFill>
+                      <a:schemeClr val="accent1">
+                        <a:lumMod val="40000"/>
+                        <a:lumOff val="60000"/>
+                      </a:schemeClr>
+                    </a:solidFill>
+                  </a:tcPr>
+                </a:tc>
+                <a:tc>
+                  <a:txBody>
+                    <a:bodyPr/>
+                    <a:lstStyle/>
+                    <a:p>
+                      <a:endParaRPr lang="en-US"/>
+                    </a:p>
+                  </a:txBody>
+                  <a:tcPr>
+                    <a:solidFill>
+                      <a:schemeClr val="accent1">
+                        <a:lumMod val="40000"/>
+                        <a:lumOff val="60000"/>
+                      </a:schemeClr>
+                    </a:solidFill>
+                  </a:tcPr>
+                </a:tc>
+                <a:tc>
+                  <a:txBody>
+                    <a:bodyPr/>
+                    <a:lstStyle/>
+                    <a:p>
+                      <a:endParaRPr lang="en-US"/>
+                    </a:p>
+                  </a:txBody>
+                  <a:tcPr>
+                    <a:solidFill>
+                      <a:schemeClr val="accent1">
+                        <a:lumMod val="40000"/>
+                        <a:lumOff val="60000"/>
+                      </a:schemeClr>
+                    </a:solidFill>
+                  </a:tcPr>
+                </a:tc>
+                <a:tc>
+                  <a:txBody>
+                    <a:bodyPr/>
+                    <a:lstStyle/>
+                    <a:p>
+                      <a:endParaRPr lang="en-US"/>
+                    </a:p>
+                  </a:txBody>
+                  <a:tcPr>
+                    <a:solidFill>
+                      <a:schemeClr val="accent1">
+                        <a:lumMod val="40000"/>
+                        <a:lumOff val="60000"/>
+                      </a:schemeClr>
+                    </a:solidFill>
+                  </a:tcPr>
+                </a:tc>
+                <a:extLst>
+                  <a:ext uri="{0D108BD9-81ED-4DB2-BD59-A6C34878D82A}">
+                    <a16:rowId xmlns:a16="http://schemas.microsoft.com/office/drawing/2014/main" val="429311566"/>
+                  </a:ext>
+                </a:extLst>
+              </a:tr>
+              <a:tr h="360000">
+                <a:tc>
+                  <a:txBody>
+                    <a:bodyPr/>
+                    <a:lstStyle/>
+                    <a:p>
+                      <a:endParaRPr lang="en-US"/>
+                    </a:p>
+                  </a:txBody>
+                  <a:tcPr>
+                    <a:solidFill>
+                      <a:schemeClr val="accent6">
+                        <a:lumMod val="40000"/>
+                        <a:lumOff val="60000"/>
+                      </a:schemeClr>
+                    </a:solidFill>
+                  </a:tcPr>
+                </a:tc>
+                <a:tc>
+                  <a:txBody>
+                    <a:bodyPr/>
+                    <a:lstStyle/>
+                    <a:p>
+                      <a:endParaRPr lang="en-US"/>
+                    </a:p>
+                  </a:txBody>
+                  <a:tcPr>
+                    <a:solidFill>
+                      <a:schemeClr val="accent6">
+                        <a:lumMod val="40000"/>
+                        <a:lumOff val="60000"/>
+                      </a:schemeClr>
+                    </a:solidFill>
+                  </a:tcPr>
+                </a:tc>
+                <a:tc>
+                  <a:txBody>
+                    <a:bodyPr/>
+                    <a:lstStyle/>
+                    <a:p>
+                      <a:endParaRPr lang="en-US" dirty="0"/>
+                    </a:p>
+                  </a:txBody>
+                  <a:tcPr>
+                    <a:solidFill>
+                      <a:schemeClr val="accent6">
+                        <a:lumMod val="40000"/>
+                        <a:lumOff val="60000"/>
+                      </a:schemeClr>
+                    </a:solidFill>
+                  </a:tcPr>
+                </a:tc>
+                <a:tc>
+                  <a:txBody>
+                    <a:bodyPr/>
+                    <a:lstStyle/>
+                    <a:p>
+                      <a:endParaRPr lang="en-US" dirty="0"/>
+                    </a:p>
+                  </a:txBody>
+                  <a:tcPr>
+                    <a:solidFill>
+                      <a:schemeClr val="accent6">
+                        <a:lumMod val="40000"/>
+                        <a:lumOff val="60000"/>
+                      </a:schemeClr>
+                    </a:solidFill>
+                  </a:tcPr>
+                </a:tc>
+                <a:tc>
+                  <a:txBody>
+                    <a:bodyPr/>
+                    <a:lstStyle/>
+                    <a:p>
+                      <a:endParaRPr lang="en-US" dirty="0"/>
+                    </a:p>
+                  </a:txBody>
+                  <a:tcPr>
+                    <a:solidFill>
+                      <a:schemeClr val="accent1">
+                        <a:lumMod val="40000"/>
+                        <a:lumOff val="60000"/>
+                      </a:schemeClr>
+                    </a:solidFill>
+                  </a:tcPr>
+                </a:tc>
+                <a:tc>
+                  <a:txBody>
+                    <a:bodyPr/>
+                    <a:lstStyle/>
+                    <a:p>
+                      <a:endParaRPr lang="en-US" dirty="0"/>
+                    </a:p>
+                  </a:txBody>
+                  <a:tcPr>
+                    <a:solidFill>
+                      <a:schemeClr val="accent1">
+                        <a:lumMod val="40000"/>
+                        <a:lumOff val="60000"/>
+                      </a:schemeClr>
+                    </a:solidFill>
+                  </a:tcPr>
+                </a:tc>
+                <a:tc>
+                  <a:txBody>
+                    <a:bodyPr/>
+                    <a:lstStyle/>
+                    <a:p>
+                      <a:endParaRPr lang="en-US" dirty="0"/>
+                    </a:p>
+                  </a:txBody>
+                  <a:tcPr>
+                    <a:solidFill>
+                      <a:schemeClr val="accent1">
+                        <a:lumMod val="40000"/>
+                        <a:lumOff val="60000"/>
+                      </a:schemeClr>
+                    </a:solidFill>
+                  </a:tcPr>
+                </a:tc>
+                <a:tc>
+                  <a:txBody>
+                    <a:bodyPr/>
+                    <a:lstStyle/>
+                    <a:p>
+                      <a:endParaRPr lang="en-US" dirty="0"/>
+                    </a:p>
+                  </a:txBody>
+                  <a:tcPr>
+                    <a:solidFill>
+                      <a:schemeClr val="accent1">
+                        <a:lumMod val="40000"/>
+                        <a:lumOff val="60000"/>
+                      </a:schemeClr>
+                    </a:solidFill>
+                  </a:tcPr>
+                </a:tc>
+                <a:extLst>
+                  <a:ext uri="{0D108BD9-81ED-4DB2-BD59-A6C34878D82A}">
+                    <a16:rowId xmlns:a16="http://schemas.microsoft.com/office/drawing/2014/main" val="1320477161"/>
+                  </a:ext>
+                </a:extLst>
+              </a:tr>
+              <a:tr h="360000">
+                <a:tc>
+                  <a:txBody>
+                    <a:bodyPr/>
+                    <a:lstStyle/>
+                    <a:p>
+                      <a:endParaRPr lang="en-US" dirty="0"/>
+                    </a:p>
+                  </a:txBody>
+                  <a:tcPr>
+                    <a:solidFill>
+                      <a:schemeClr val="accent2">
+                        <a:lumMod val="40000"/>
+                        <a:lumOff val="60000"/>
+                      </a:schemeClr>
+                    </a:solidFill>
+                  </a:tcPr>
+                </a:tc>
+                <a:tc>
+                  <a:txBody>
+                    <a:bodyPr/>
+                    <a:lstStyle/>
+                    <a:p>
+                      <a:endParaRPr lang="en-US" dirty="0"/>
+                    </a:p>
+                  </a:txBody>
+                  <a:tcPr>
+                    <a:solidFill>
+                      <a:schemeClr val="accent2">
+                        <a:lumMod val="40000"/>
+                        <a:lumOff val="60000"/>
+                      </a:schemeClr>
+                    </a:solidFill>
+                  </a:tcPr>
+                </a:tc>
+                <a:tc>
+                  <a:txBody>
+                    <a:bodyPr/>
+                    <a:lstStyle/>
+                    <a:p>
+                      <a:endParaRPr lang="en-US" dirty="0"/>
+                    </a:p>
+                  </a:txBody>
+                  <a:tcPr>
+                    <a:solidFill>
+                      <a:schemeClr val="accent2">
+                        <a:lumMod val="40000"/>
+                        <a:lumOff val="60000"/>
+                      </a:schemeClr>
+                    </a:solidFill>
+                  </a:tcPr>
+                </a:tc>
+                <a:tc>
+                  <a:txBody>
+                    <a:bodyPr/>
+                    <a:lstStyle/>
+                    <a:p>
+                      <a:endParaRPr lang="en-US"/>
+                    </a:p>
+                  </a:txBody>
+                  <a:tcPr>
+                    <a:solidFill>
+                      <a:schemeClr val="accent2">
+                        <a:lumMod val="40000"/>
+                        <a:lumOff val="60000"/>
+                      </a:schemeClr>
+                    </a:solidFill>
+                  </a:tcPr>
+                </a:tc>
+                <a:tc>
+                  <a:txBody>
+                    <a:bodyPr/>
+                    <a:lstStyle/>
+                    <a:p>
+                      <a:endParaRPr lang="en-US" dirty="0"/>
+                    </a:p>
+                  </a:txBody>
+                  <a:tcPr>
+                    <a:solidFill>
+                      <a:schemeClr val="accent6">
+                        <a:lumMod val="40000"/>
+                        <a:lumOff val="60000"/>
+                      </a:schemeClr>
+                    </a:solidFill>
+                  </a:tcPr>
+                </a:tc>
+                <a:tc>
+                  <a:txBody>
+                    <a:bodyPr/>
+                    <a:lstStyle/>
+                    <a:p>
+                      <a:endParaRPr lang="en-US" dirty="0"/>
+                    </a:p>
+                  </a:txBody>
+                  <a:tcPr>
+                    <a:solidFill>
+                      <a:schemeClr val="accent6">
+                        <a:lumMod val="40000"/>
+                        <a:lumOff val="60000"/>
+                      </a:schemeClr>
+                    </a:solidFill>
+                  </a:tcPr>
+                </a:tc>
+                <a:tc>
+                  <a:txBody>
+                    <a:bodyPr/>
+                    <a:lstStyle/>
+                    <a:p>
+                      <a:endParaRPr lang="en-US" dirty="0"/>
+                    </a:p>
+                  </a:txBody>
+                  <a:tcPr>
+                    <a:solidFill>
+                      <a:schemeClr val="accent6">
+                        <a:lumMod val="40000"/>
+                        <a:lumOff val="60000"/>
+                      </a:schemeClr>
+                    </a:solidFill>
+                  </a:tcPr>
+                </a:tc>
+                <a:tc>
+                  <a:txBody>
+                    <a:bodyPr/>
+                    <a:lstStyle/>
+                    <a:p>
+                      <a:endParaRPr lang="en-US" dirty="0"/>
+                    </a:p>
+                  </a:txBody>
+                  <a:tcPr>
+                    <a:solidFill>
+                      <a:schemeClr val="accent6">
+                        <a:lumMod val="40000"/>
+                        <a:lumOff val="60000"/>
+                      </a:schemeClr>
+                    </a:solidFill>
+                  </a:tcPr>
+                </a:tc>
+                <a:extLst>
+                  <a:ext uri="{0D108BD9-81ED-4DB2-BD59-A6C34878D82A}">
+                    <a16:rowId xmlns:a16="http://schemas.microsoft.com/office/drawing/2014/main" val="1199484508"/>
+                  </a:ext>
+                </a:extLst>
+              </a:tr>
+              <a:tr h="360000">
+                <a:tc>
+                  <a:txBody>
+                    <a:bodyPr/>
+                    <a:lstStyle/>
+                    <a:p>
+                      <a:endParaRPr lang="en-US"/>
+                    </a:p>
+                  </a:txBody>
+                  <a:tcPr>
+                    <a:solidFill>
+                      <a:schemeClr val="accent2">
+                        <a:lumMod val="40000"/>
+                        <a:lumOff val="60000"/>
+                      </a:schemeClr>
+                    </a:solidFill>
+                  </a:tcPr>
+                </a:tc>
+                <a:tc>
+                  <a:txBody>
+                    <a:bodyPr/>
+                    <a:lstStyle/>
+                    <a:p>
+                      <a:endParaRPr lang="en-US"/>
+                    </a:p>
+                  </a:txBody>
+                  <a:tcPr>
+                    <a:solidFill>
+                      <a:schemeClr val="accent2">
+                        <a:lumMod val="40000"/>
+                        <a:lumOff val="60000"/>
+                      </a:schemeClr>
+                    </a:solidFill>
+                  </a:tcPr>
+                </a:tc>
+                <a:tc>
+                  <a:txBody>
+                    <a:bodyPr/>
+                    <a:lstStyle/>
+                    <a:p>
+                      <a:endParaRPr lang="en-US" dirty="0"/>
+                    </a:p>
+                  </a:txBody>
+                  <a:tcPr>
+                    <a:solidFill>
+                      <a:schemeClr val="accent2">
+                        <a:lumMod val="40000"/>
+                        <a:lumOff val="60000"/>
+                      </a:schemeClr>
+                    </a:solidFill>
+                  </a:tcPr>
+                </a:tc>
+                <a:tc>
+                  <a:txBody>
+                    <a:bodyPr/>
+                    <a:lstStyle/>
+                    <a:p>
+                      <a:endParaRPr lang="en-US" dirty="0"/>
+                    </a:p>
+                  </a:txBody>
+                  <a:tcPr>
+                    <a:solidFill>
+                      <a:schemeClr val="accent2">
+                        <a:lumMod val="40000"/>
+                        <a:lumOff val="60000"/>
+                      </a:schemeClr>
+                    </a:solidFill>
+                  </a:tcPr>
+                </a:tc>
+                <a:tc>
+                  <a:txBody>
+                    <a:bodyPr/>
+                    <a:lstStyle/>
+                    <a:p>
+                      <a:endParaRPr lang="en-US"/>
+                    </a:p>
+                  </a:txBody>
+                  <a:tcPr>
+                    <a:solidFill>
+                      <a:schemeClr val="accent6">
+                        <a:lumMod val="40000"/>
+                        <a:lumOff val="60000"/>
+                      </a:schemeClr>
+                    </a:solidFill>
+                  </a:tcPr>
+                </a:tc>
+                <a:tc>
+                  <a:txBody>
+                    <a:bodyPr/>
+                    <a:lstStyle/>
+                    <a:p>
+                      <a:endParaRPr lang="en-US"/>
+                    </a:p>
+                  </a:txBody>
+                  <a:tcPr>
+                    <a:solidFill>
+                      <a:schemeClr val="accent6">
+                        <a:lumMod val="40000"/>
+                        <a:lumOff val="60000"/>
+                      </a:schemeClr>
+                    </a:solidFill>
+                  </a:tcPr>
+                </a:tc>
+                <a:tc>
+                  <a:txBody>
+                    <a:bodyPr/>
+                    <a:lstStyle/>
+                    <a:p>
+                      <a:endParaRPr lang="en-US" dirty="0"/>
+                    </a:p>
+                  </a:txBody>
+                  <a:tcPr>
+                    <a:solidFill>
+                      <a:schemeClr val="accent6">
+                        <a:lumMod val="40000"/>
+                        <a:lumOff val="60000"/>
+                      </a:schemeClr>
+                    </a:solidFill>
+                  </a:tcPr>
+                </a:tc>
+                <a:tc>
+                  <a:txBody>
+                    <a:bodyPr/>
+                    <a:lstStyle/>
+                    <a:p>
+                      <a:endParaRPr lang="en-US" dirty="0"/>
+                    </a:p>
+                  </a:txBody>
+                  <a:tcPr>
+                    <a:solidFill>
+                      <a:schemeClr val="accent6">
+                        <a:lumMod val="40000"/>
+                        <a:lumOff val="60000"/>
+                      </a:schemeClr>
+                    </a:solidFill>
+                  </a:tcPr>
+                </a:tc>
+                <a:extLst>
+                  <a:ext uri="{0D108BD9-81ED-4DB2-BD59-A6C34878D82A}">
+                    <a16:rowId xmlns:a16="http://schemas.microsoft.com/office/drawing/2014/main" val="4115094472"/>
+                  </a:ext>
+                </a:extLst>
+              </a:tr>
+            </a:tbl>
+          </a:graphicData>
+        </a:graphic>
+      </p:graphicFrame>
+      <p:cxnSp>
+        <p:nvCxnSpPr>
+          <p:cNvPr id="4" name="直接箭头连接符 3">
+            <a:extLst>
+              <a:ext uri="{FF2B5EF4-FFF2-40B4-BE49-F238E27FC236}">
+                <a16:creationId xmlns:a16="http://schemas.microsoft.com/office/drawing/2014/main" id="{8AFD2A37-30F4-7AB9-549F-AAEC44AFECD9}"/>
+              </a:ext>
+            </a:extLst>
+          </p:cNvPr>
+          <p:cNvCxnSpPr/>
+          <p:nvPr/>
+        </p:nvCxnSpPr>
+        <p:spPr>
+          <a:xfrm>
+            <a:off x="2464904" y="1558456"/>
+            <a:ext cx="2544418" cy="0"/>
+          </a:xfrm>
+          <a:prstGeom prst="straightConnector1">
+            <a:avLst/>
+          </a:prstGeom>
+          <a:ln w="28575">
+            <a:tailEnd type="triangle"/>
+          </a:ln>
+        </p:spPr>
+        <p:style>
+          <a:lnRef idx="2">
+            <a:schemeClr val="dk1"/>
+          </a:lnRef>
+          <a:fillRef idx="0">
+            <a:schemeClr val="dk1"/>
+          </a:fillRef>
+          <a:effectRef idx="1">
+            <a:schemeClr val="dk1"/>
+          </a:effectRef>
+          <a:fontRef idx="minor">
+            <a:schemeClr val="tx1"/>
+          </a:fontRef>
+        </p:style>
+      </p:cxnSp>
+      <p:cxnSp>
+        <p:nvCxnSpPr>
+          <p:cNvPr id="5" name="直接箭头连接符 4">
+            <a:extLst>
+              <a:ext uri="{FF2B5EF4-FFF2-40B4-BE49-F238E27FC236}">
+                <a16:creationId xmlns:a16="http://schemas.microsoft.com/office/drawing/2014/main" id="{24F22313-A60E-C961-4FFB-9ADC39F8230F}"/>
+              </a:ext>
+            </a:extLst>
+          </p:cNvPr>
+          <p:cNvCxnSpPr/>
+          <p:nvPr/>
+        </p:nvCxnSpPr>
+        <p:spPr>
+          <a:xfrm>
+            <a:off x="2464904" y="1933493"/>
+            <a:ext cx="2544418" cy="0"/>
+          </a:xfrm>
+          <a:prstGeom prst="straightConnector1">
+            <a:avLst/>
+          </a:prstGeom>
+          <a:ln w="28575">
+            <a:tailEnd type="triangle"/>
+          </a:ln>
+        </p:spPr>
+        <p:style>
+          <a:lnRef idx="2">
+            <a:schemeClr val="dk1"/>
+          </a:lnRef>
+          <a:fillRef idx="0">
+            <a:schemeClr val="dk1"/>
+          </a:fillRef>
+          <a:effectRef idx="1">
+            <a:schemeClr val="dk1"/>
+          </a:effectRef>
+          <a:fontRef idx="minor">
+            <a:schemeClr val="tx1"/>
+          </a:fontRef>
+        </p:style>
+      </p:cxnSp>
+      <p:cxnSp>
+        <p:nvCxnSpPr>
+          <p:cNvPr id="6" name="直接箭头连接符 5">
+            <a:extLst>
+              <a:ext uri="{FF2B5EF4-FFF2-40B4-BE49-F238E27FC236}">
+                <a16:creationId xmlns:a16="http://schemas.microsoft.com/office/drawing/2014/main" id="{193352A0-2BC2-A5AB-0715-34F68DE18598}"/>
+              </a:ext>
+            </a:extLst>
+          </p:cNvPr>
+          <p:cNvCxnSpPr>
+            <a:cxnSpLocks/>
+          </p:cNvCxnSpPr>
+          <p:nvPr/>
+        </p:nvCxnSpPr>
+        <p:spPr>
+          <a:xfrm flipH="1">
+            <a:off x="2464904" y="1619250"/>
+            <a:ext cx="2544418" cy="261938"/>
+          </a:xfrm>
+          <a:prstGeom prst="straightConnector1">
+            <a:avLst/>
+          </a:prstGeom>
+          <a:ln w="28575">
+            <a:tailEnd type="triangle"/>
+          </a:ln>
+        </p:spPr>
+        <p:style>
+          <a:lnRef idx="2">
+            <a:schemeClr val="dk1"/>
+          </a:lnRef>
+          <a:fillRef idx="0">
+            <a:schemeClr val="dk1"/>
+          </a:fillRef>
+          <a:effectRef idx="1">
+            <a:schemeClr val="dk1"/>
+          </a:effectRef>
+          <a:fontRef idx="minor">
+            <a:schemeClr val="tx1"/>
+          </a:fontRef>
+        </p:style>
+      </p:cxnSp>
+      <p:cxnSp>
+        <p:nvCxnSpPr>
+          <p:cNvPr id="11" name="直接箭头连接符 10">
+            <a:extLst>
+              <a:ext uri="{FF2B5EF4-FFF2-40B4-BE49-F238E27FC236}">
+                <a16:creationId xmlns:a16="http://schemas.microsoft.com/office/drawing/2014/main" id="{05149932-D1DE-29AD-DB4A-4415556B5584}"/>
+              </a:ext>
+            </a:extLst>
+          </p:cNvPr>
+          <p:cNvCxnSpPr>
+            <a:cxnSpLocks/>
+          </p:cNvCxnSpPr>
+          <p:nvPr/>
+        </p:nvCxnSpPr>
+        <p:spPr>
+          <a:xfrm flipH="1">
+            <a:off x="2464904" y="1994369"/>
+            <a:ext cx="2544418" cy="261938"/>
+          </a:xfrm>
+          <a:prstGeom prst="straightConnector1">
+            <a:avLst/>
+          </a:prstGeom>
+          <a:ln w="28575">
+            <a:tailEnd type="triangle"/>
+          </a:ln>
+        </p:spPr>
+        <p:style>
+          <a:lnRef idx="2">
+            <a:schemeClr val="dk1"/>
+          </a:lnRef>
+          <a:fillRef idx="0">
+            <a:schemeClr val="dk1"/>
+          </a:fillRef>
+          <a:effectRef idx="1">
+            <a:schemeClr val="dk1"/>
+          </a:effectRef>
+          <a:fontRef idx="minor">
+            <a:schemeClr val="tx1"/>
+          </a:fontRef>
+        </p:style>
+      </p:cxnSp>
+      <p:cxnSp>
+        <p:nvCxnSpPr>
+          <p:cNvPr id="12" name="直接箭头连接符 11">
+            <a:extLst>
+              <a:ext uri="{FF2B5EF4-FFF2-40B4-BE49-F238E27FC236}">
+                <a16:creationId xmlns:a16="http://schemas.microsoft.com/office/drawing/2014/main" id="{6FD359AC-727C-A19A-8DE4-0231304DE228}"/>
+              </a:ext>
+            </a:extLst>
+          </p:cNvPr>
+          <p:cNvCxnSpPr/>
+          <p:nvPr/>
+        </p:nvCxnSpPr>
+        <p:spPr>
+          <a:xfrm>
+            <a:off x="2487363" y="2324432"/>
+            <a:ext cx="2544418" cy="0"/>
+          </a:xfrm>
+          <a:prstGeom prst="straightConnector1">
+            <a:avLst/>
+          </a:prstGeom>
+          <a:ln w="28575">
+            <a:tailEnd type="triangle"/>
+          </a:ln>
+        </p:spPr>
+        <p:style>
+          <a:lnRef idx="2">
+            <a:schemeClr val="dk1"/>
+          </a:lnRef>
+          <a:fillRef idx="0">
+            <a:schemeClr val="dk1"/>
+          </a:fillRef>
+          <a:effectRef idx="1">
+            <a:schemeClr val="dk1"/>
+          </a:effectRef>
+          <a:fontRef idx="minor">
+            <a:schemeClr val="tx1"/>
+          </a:fontRef>
+        </p:style>
+      </p:cxnSp>
+      <p:sp>
+        <p:nvSpPr>
+          <p:cNvPr id="13" name="文本框 12">
+            <a:extLst>
+              <a:ext uri="{FF2B5EF4-FFF2-40B4-BE49-F238E27FC236}">
+                <a16:creationId xmlns:a16="http://schemas.microsoft.com/office/drawing/2014/main" id="{26E27BF2-B860-9953-F6D1-8A3DD66F2EFB}"/>
+              </a:ext>
+            </a:extLst>
+          </p:cNvPr>
+          <p:cNvSpPr txBox="1"/>
+          <p:nvPr/>
+        </p:nvSpPr>
+        <p:spPr>
+          <a:xfrm>
+            <a:off x="1657161" y="2246071"/>
+            <a:ext cx="402674" cy="461665"/>
+          </a:xfrm>
+          <a:prstGeom prst="rect">
+            <a:avLst/>
+          </a:prstGeom>
+          <a:noFill/>
+        </p:spPr>
+        <p:txBody>
+          <a:bodyPr wrap="none" rtlCol="0">
+            <a:spAutoFit/>
+          </a:bodyPr>
+          <a:lstStyle/>
+          <a:p>
+            <a:r>
+              <a:rPr lang="en-US" sz="2400" dirty="0"/>
+              <a:t>N</a:t>
+            </a:r>
+          </a:p>
+        </p:txBody>
+      </p:sp>
+      <p:sp>
+        <p:nvSpPr>
+          <p:cNvPr id="14" name="文本框 13">
+            <a:extLst>
+              <a:ext uri="{FF2B5EF4-FFF2-40B4-BE49-F238E27FC236}">
+                <a16:creationId xmlns:a16="http://schemas.microsoft.com/office/drawing/2014/main" id="{0BAF1759-A0CB-6BED-6EB2-CFF37C1F13D2}"/>
+              </a:ext>
+            </a:extLst>
+          </p:cNvPr>
+          <p:cNvSpPr txBox="1"/>
+          <p:nvPr/>
+        </p:nvSpPr>
+        <p:spPr>
+          <a:xfrm>
+            <a:off x="3557416" y="719931"/>
+            <a:ext cx="359394" cy="461665"/>
+          </a:xfrm>
+          <a:prstGeom prst="rect">
+            <a:avLst/>
+          </a:prstGeom>
+          <a:noFill/>
+        </p:spPr>
+        <p:txBody>
+          <a:bodyPr wrap="none" rtlCol="0">
+            <a:spAutoFit/>
+          </a:bodyPr>
+          <a:lstStyle/>
+          <a:p>
+            <a:r>
+              <a:rPr lang="en-US" sz="2400" dirty="0"/>
+              <a:t>K</a:t>
+            </a:r>
+          </a:p>
+        </p:txBody>
+      </p:sp>
+      <p:sp>
+        <p:nvSpPr>
+          <p:cNvPr id="15" name="右大括号 14">
+            <a:extLst>
+              <a:ext uri="{FF2B5EF4-FFF2-40B4-BE49-F238E27FC236}">
+                <a16:creationId xmlns:a16="http://schemas.microsoft.com/office/drawing/2014/main" id="{5F05126F-CD5F-0C3F-0680-F2E822579127}"/>
+              </a:ext>
+            </a:extLst>
+          </p:cNvPr>
+          <p:cNvSpPr/>
+          <p:nvPr/>
+        </p:nvSpPr>
+        <p:spPr>
+          <a:xfrm rot="16200000">
+            <a:off x="3636049" y="-232233"/>
+            <a:ext cx="164882" cy="2879999"/>
+          </a:xfrm>
+          <a:prstGeom prst="rightBrace">
+            <a:avLst>
+              <a:gd name="adj1" fmla="val 88333"/>
+              <a:gd name="adj2" fmla="val 50000"/>
+            </a:avLst>
+          </a:prstGeom>
+          <a:ln w="28575"/>
+        </p:spPr>
+        <p:style>
+          <a:lnRef idx="2">
+            <a:schemeClr val="dk1"/>
+          </a:lnRef>
+          <a:fillRef idx="0">
+            <a:schemeClr val="dk1"/>
+          </a:fillRef>
+          <a:effectRef idx="1">
+            <a:schemeClr val="dk1"/>
+          </a:effectRef>
+          <a:fontRef idx="minor">
+            <a:schemeClr val="tx1"/>
+          </a:fontRef>
+        </p:style>
+        <p:txBody>
+          <a:bodyPr rtlCol="0" anchor="ctr"/>
+          <a:lstStyle/>
+          <a:p>
+            <a:pPr algn="ctr"/>
+            <a:endParaRPr lang="en-US"/>
+          </a:p>
+        </p:txBody>
+      </p:sp>
+      <p:sp>
+        <p:nvSpPr>
+          <p:cNvPr id="16" name="右大括号 15">
+            <a:extLst>
+              <a:ext uri="{FF2B5EF4-FFF2-40B4-BE49-F238E27FC236}">
+                <a16:creationId xmlns:a16="http://schemas.microsoft.com/office/drawing/2014/main" id="{AD71B69F-6863-6DFE-82BE-B5B5E8B1BFE5}"/>
+              </a:ext>
+            </a:extLst>
+          </p:cNvPr>
+          <p:cNvSpPr/>
+          <p:nvPr/>
+        </p:nvSpPr>
+        <p:spPr>
+          <a:xfrm rot="10800000">
+            <a:off x="2051978" y="1379623"/>
+            <a:ext cx="164882" cy="2194559"/>
+          </a:xfrm>
+          <a:prstGeom prst="rightBrace">
+            <a:avLst>
+              <a:gd name="adj1" fmla="val 88333"/>
+              <a:gd name="adj2" fmla="val 50000"/>
+            </a:avLst>
+          </a:prstGeom>
+          <a:ln w="28575"/>
+        </p:spPr>
+        <p:style>
+          <a:lnRef idx="2">
+            <a:schemeClr val="dk1"/>
+          </a:lnRef>
+          <a:fillRef idx="0">
+            <a:schemeClr val="dk1"/>
+          </a:fillRef>
+          <a:effectRef idx="1">
+            <a:schemeClr val="dk1"/>
+          </a:effectRef>
+          <a:fontRef idx="minor">
+            <a:schemeClr val="tx1"/>
+          </a:fontRef>
+        </p:style>
+        <p:txBody>
+          <a:bodyPr rtlCol="0" anchor="ctr"/>
+          <a:lstStyle/>
+          <a:p>
+            <a:pPr algn="ctr"/>
+            <a:endParaRPr lang="en-US"/>
+          </a:p>
+        </p:txBody>
+      </p:sp>
+      <p:graphicFrame>
+        <p:nvGraphicFramePr>
+          <p:cNvPr id="17" name="表格 16">
+            <a:extLst>
+              <a:ext uri="{FF2B5EF4-FFF2-40B4-BE49-F238E27FC236}">
+                <a16:creationId xmlns:a16="http://schemas.microsoft.com/office/drawing/2014/main" id="{ED0251C8-D4CC-7D43-EA09-9EF1B22D28DA}"/>
+              </a:ext>
+            </a:extLst>
+          </p:cNvPr>
+          <p:cNvGraphicFramePr>
+            <a:graphicFrameLocks noGrp="1"/>
+          </p:cNvGraphicFramePr>
+          <p:nvPr>
+            <p:extLst>
+              <p:ext uri="{D42A27DB-BD31-4B8C-83A1-F6EECF244321}">
+                <p14:modId xmlns:p14="http://schemas.microsoft.com/office/powerpoint/2010/main" val="3754803177"/>
+              </p:ext>
+            </p:extLst>
+          </p:nvPr>
+        </p:nvGraphicFramePr>
+        <p:xfrm>
+          <a:off x="6593974" y="2125338"/>
+          <a:ext cx="1440000" cy="731520"/>
+        </p:xfrm>
+        <a:graphic>
+          <a:graphicData uri="http://schemas.openxmlformats.org/drawingml/2006/table">
+            <a:tbl>
+              <a:tblPr firstRow="1" bandRow="1">
+                <a:tableStyleId>{5940675A-B579-460E-94D1-54222C63F5DA}</a:tableStyleId>
+              </a:tblPr>
+              <a:tblGrid>
+                <a:gridCol w="360000">
+                  <a:extLst>
+                    <a:ext uri="{9D8B030D-6E8A-4147-A177-3AD203B41FA5}">
+                      <a16:colId xmlns:a16="http://schemas.microsoft.com/office/drawing/2014/main" val="2034969248"/>
+                    </a:ext>
+                  </a:extLst>
+                </a:gridCol>
+                <a:gridCol w="360000">
+                  <a:extLst>
+                    <a:ext uri="{9D8B030D-6E8A-4147-A177-3AD203B41FA5}">
+                      <a16:colId xmlns:a16="http://schemas.microsoft.com/office/drawing/2014/main" val="4259093849"/>
+                    </a:ext>
+                  </a:extLst>
+                </a:gridCol>
+                <a:gridCol w="360000">
+                  <a:extLst>
+                    <a:ext uri="{9D8B030D-6E8A-4147-A177-3AD203B41FA5}">
+                      <a16:colId xmlns:a16="http://schemas.microsoft.com/office/drawing/2014/main" val="1669695598"/>
+                    </a:ext>
+                  </a:extLst>
+                </a:gridCol>
+                <a:gridCol w="360000">
+                  <a:extLst>
+                    <a:ext uri="{9D8B030D-6E8A-4147-A177-3AD203B41FA5}">
+                      <a16:colId xmlns:a16="http://schemas.microsoft.com/office/drawing/2014/main" val="3881258515"/>
+                    </a:ext>
+                  </a:extLst>
+                </a:gridCol>
+              </a:tblGrid>
+              <a:tr h="360000">
+                <a:tc>
+                  <a:txBody>
+                    <a:bodyPr/>
+                    <a:lstStyle/>
+                    <a:p>
+                      <a:endParaRPr lang="en-US" dirty="0"/>
+                    </a:p>
+                  </a:txBody>
+                  <a:tcPr>
+                    <a:solidFill>
+                      <a:schemeClr val="accent1">
+                        <a:lumMod val="40000"/>
+                        <a:lumOff val="60000"/>
+                      </a:schemeClr>
+                    </a:solidFill>
+                  </a:tcPr>
+                </a:tc>
+                <a:tc>
+                  <a:txBody>
+                    <a:bodyPr/>
+                    <a:lstStyle/>
+                    <a:p>
+                      <a:endParaRPr lang="en-US" dirty="0"/>
+                    </a:p>
+                  </a:txBody>
+                  <a:tcPr>
+                    <a:solidFill>
+                      <a:schemeClr val="accent1">
+                        <a:lumMod val="40000"/>
+                        <a:lumOff val="60000"/>
+                      </a:schemeClr>
+                    </a:solidFill>
+                  </a:tcPr>
+                </a:tc>
+                <a:tc>
+                  <a:txBody>
+                    <a:bodyPr/>
+                    <a:lstStyle/>
+                    <a:p>
+                      <a:endParaRPr lang="en-US" dirty="0"/>
+                    </a:p>
+                  </a:txBody>
+                  <a:tcPr>
+                    <a:solidFill>
+                      <a:schemeClr val="accent1">
+                        <a:lumMod val="40000"/>
+                        <a:lumOff val="60000"/>
+                      </a:schemeClr>
+                    </a:solidFill>
+                  </a:tcPr>
+                </a:tc>
+                <a:tc>
+                  <a:txBody>
+                    <a:bodyPr/>
+                    <a:lstStyle/>
+                    <a:p>
+                      <a:endParaRPr lang="en-US"/>
+                    </a:p>
+                  </a:txBody>
+                  <a:tcPr>
+                    <a:solidFill>
+                      <a:schemeClr val="accent1">
+                        <a:lumMod val="40000"/>
+                        <a:lumOff val="60000"/>
+                      </a:schemeClr>
+                    </a:solidFill>
+                  </a:tcPr>
+                </a:tc>
+                <a:extLst>
+                  <a:ext uri="{0D108BD9-81ED-4DB2-BD59-A6C34878D82A}">
+                    <a16:rowId xmlns:a16="http://schemas.microsoft.com/office/drawing/2014/main" val="1340743427"/>
+                  </a:ext>
+                </a:extLst>
+              </a:tr>
+              <a:tr h="360000">
+                <a:tc>
+                  <a:txBody>
+                    <a:bodyPr/>
+                    <a:lstStyle/>
+                    <a:p>
+                      <a:endParaRPr lang="en-US"/>
+                    </a:p>
+                  </a:txBody>
+                  <a:tcPr>
+                    <a:solidFill>
+                      <a:schemeClr val="accent1">
+                        <a:lumMod val="40000"/>
+                        <a:lumOff val="60000"/>
+                      </a:schemeClr>
+                    </a:solidFill>
+                  </a:tcPr>
+                </a:tc>
+                <a:tc>
+                  <a:txBody>
+                    <a:bodyPr/>
+                    <a:lstStyle/>
+                    <a:p>
+                      <a:endParaRPr lang="en-US"/>
+                    </a:p>
+                  </a:txBody>
+                  <a:tcPr>
+                    <a:solidFill>
+                      <a:schemeClr val="accent1">
+                        <a:lumMod val="40000"/>
+                        <a:lumOff val="60000"/>
+                      </a:schemeClr>
+                    </a:solidFill>
+                  </a:tcPr>
+                </a:tc>
+                <a:tc>
+                  <a:txBody>
+                    <a:bodyPr/>
+                    <a:lstStyle/>
+                    <a:p>
+                      <a:endParaRPr lang="en-US" dirty="0"/>
+                    </a:p>
+                  </a:txBody>
+                  <a:tcPr>
+                    <a:solidFill>
+                      <a:schemeClr val="accent1">
+                        <a:lumMod val="40000"/>
+                        <a:lumOff val="60000"/>
+                      </a:schemeClr>
+                    </a:solidFill>
+                  </a:tcPr>
+                </a:tc>
+                <a:tc>
+                  <a:txBody>
+                    <a:bodyPr/>
+                    <a:lstStyle/>
+                    <a:p>
+                      <a:endParaRPr lang="en-US" dirty="0"/>
+                    </a:p>
+                  </a:txBody>
+                  <a:tcPr>
+                    <a:solidFill>
+                      <a:schemeClr val="accent1">
+                        <a:lumMod val="40000"/>
+                        <a:lumOff val="60000"/>
+                      </a:schemeClr>
+                    </a:solidFill>
+                  </a:tcPr>
+                </a:tc>
+                <a:extLst>
+                  <a:ext uri="{0D108BD9-81ED-4DB2-BD59-A6C34878D82A}">
+                    <a16:rowId xmlns:a16="http://schemas.microsoft.com/office/drawing/2014/main" val="4081798692"/>
+                  </a:ext>
+                </a:extLst>
+              </a:tr>
+            </a:tbl>
+          </a:graphicData>
+        </a:graphic>
+      </p:graphicFrame>
+      <p:sp>
+        <p:nvSpPr>
+          <p:cNvPr id="18" name="文本框 17">
+            <a:extLst>
+              <a:ext uri="{FF2B5EF4-FFF2-40B4-BE49-F238E27FC236}">
+                <a16:creationId xmlns:a16="http://schemas.microsoft.com/office/drawing/2014/main" id="{AD99ED77-5EFF-CDC2-8B8C-7058F3370B3D}"/>
+              </a:ext>
+            </a:extLst>
+          </p:cNvPr>
+          <p:cNvSpPr txBox="1"/>
+          <p:nvPr/>
+        </p:nvSpPr>
+        <p:spPr>
+          <a:xfrm>
+            <a:off x="2711579" y="3663600"/>
+            <a:ext cx="2013821" cy="461665"/>
+          </a:xfrm>
+          <a:prstGeom prst="rect">
+            <a:avLst/>
+          </a:prstGeom>
+          <a:noFill/>
+        </p:spPr>
+        <p:txBody>
+          <a:bodyPr wrap="none" rtlCol="0">
+            <a:spAutoFit/>
+          </a:bodyPr>
+          <a:lstStyle/>
+          <a:p>
+            <a:r>
+              <a:rPr lang="en-US" sz="2400" dirty="0"/>
+              <a:t>gmem_tensor</a:t>
+            </a:r>
+          </a:p>
+        </p:txBody>
+      </p:sp>
+      <p:sp>
+        <p:nvSpPr>
+          <p:cNvPr id="19" name="文本框 18">
+            <a:extLst>
+              <a:ext uri="{FF2B5EF4-FFF2-40B4-BE49-F238E27FC236}">
+                <a16:creationId xmlns:a16="http://schemas.microsoft.com/office/drawing/2014/main" id="{3527E971-07B9-1D11-30ED-D911FC206C13}"/>
+              </a:ext>
+            </a:extLst>
+          </p:cNvPr>
+          <p:cNvSpPr txBox="1"/>
+          <p:nvPr/>
+        </p:nvSpPr>
+        <p:spPr>
+          <a:xfrm>
+            <a:off x="6307063" y="3663599"/>
+            <a:ext cx="2013821" cy="461665"/>
+          </a:xfrm>
+          <a:prstGeom prst="rect">
+            <a:avLst/>
+          </a:prstGeom>
+          <a:noFill/>
+        </p:spPr>
+        <p:txBody>
+          <a:bodyPr wrap="none" rtlCol="0">
+            <a:spAutoFit/>
+          </a:bodyPr>
+          <a:lstStyle/>
+          <a:p>
+            <a:r>
+              <a:rPr lang="en-US" sz="2400" dirty="0"/>
+              <a:t>smem_tensor</a:t>
+            </a:r>
+          </a:p>
+        </p:txBody>
+      </p:sp>
+      <p:cxnSp>
+        <p:nvCxnSpPr>
+          <p:cNvPr id="20" name="直接箭头连接符 19">
+            <a:extLst>
+              <a:ext uri="{FF2B5EF4-FFF2-40B4-BE49-F238E27FC236}">
+                <a16:creationId xmlns:a16="http://schemas.microsoft.com/office/drawing/2014/main" id="{26701450-51D2-EBCD-6F82-C52B41472787}"/>
+              </a:ext>
+            </a:extLst>
+          </p:cNvPr>
+          <p:cNvCxnSpPr>
+            <a:cxnSpLocks/>
+          </p:cNvCxnSpPr>
+          <p:nvPr/>
+        </p:nvCxnSpPr>
+        <p:spPr>
+          <a:xfrm>
+            <a:off x="6761765" y="2323107"/>
+            <a:ext cx="1122530" cy="0"/>
+          </a:xfrm>
+          <a:prstGeom prst="straightConnector1">
+            <a:avLst/>
+          </a:prstGeom>
+          <a:ln w="28575">
+            <a:tailEnd type="triangle"/>
+          </a:ln>
+        </p:spPr>
+        <p:style>
+          <a:lnRef idx="2">
+            <a:schemeClr val="dk1"/>
+          </a:lnRef>
+          <a:fillRef idx="0">
+            <a:schemeClr val="dk1"/>
+          </a:fillRef>
+          <a:effectRef idx="1">
+            <a:schemeClr val="dk1"/>
+          </a:effectRef>
+          <a:fontRef idx="minor">
+            <a:schemeClr val="tx1"/>
+          </a:fontRef>
+        </p:style>
+      </p:cxnSp>
+      <p:cxnSp>
+        <p:nvCxnSpPr>
+          <p:cNvPr id="21" name="直接箭头连接符 20">
+            <a:extLst>
+              <a:ext uri="{FF2B5EF4-FFF2-40B4-BE49-F238E27FC236}">
+                <a16:creationId xmlns:a16="http://schemas.microsoft.com/office/drawing/2014/main" id="{65160D9D-E019-AE27-2485-B18FB164355A}"/>
+              </a:ext>
+            </a:extLst>
+          </p:cNvPr>
+          <p:cNvCxnSpPr>
+            <a:cxnSpLocks/>
+          </p:cNvCxnSpPr>
+          <p:nvPr/>
+        </p:nvCxnSpPr>
+        <p:spPr>
+          <a:xfrm>
+            <a:off x="6761765" y="2698144"/>
+            <a:ext cx="1122530" cy="0"/>
+          </a:xfrm>
+          <a:prstGeom prst="straightConnector1">
+            <a:avLst/>
+          </a:prstGeom>
+          <a:ln w="28575">
+            <a:tailEnd type="triangle"/>
+          </a:ln>
+        </p:spPr>
+        <p:style>
+          <a:lnRef idx="2">
+            <a:schemeClr val="dk1"/>
+          </a:lnRef>
+          <a:fillRef idx="0">
+            <a:schemeClr val="dk1"/>
+          </a:fillRef>
+          <a:effectRef idx="1">
+            <a:schemeClr val="dk1"/>
+          </a:effectRef>
+          <a:fontRef idx="minor">
+            <a:schemeClr val="tx1"/>
+          </a:fontRef>
+        </p:style>
+      </p:cxnSp>
+      <p:cxnSp>
+        <p:nvCxnSpPr>
+          <p:cNvPr id="22" name="直接箭头连接符 21">
+            <a:extLst>
+              <a:ext uri="{FF2B5EF4-FFF2-40B4-BE49-F238E27FC236}">
+                <a16:creationId xmlns:a16="http://schemas.microsoft.com/office/drawing/2014/main" id="{B156D6B8-12FC-3A76-C46D-3C646B5FBF76}"/>
+              </a:ext>
+            </a:extLst>
+          </p:cNvPr>
+          <p:cNvCxnSpPr>
+            <a:cxnSpLocks/>
+          </p:cNvCxnSpPr>
+          <p:nvPr/>
+        </p:nvCxnSpPr>
+        <p:spPr>
+          <a:xfrm flipH="1">
+            <a:off x="6761765" y="2379657"/>
+            <a:ext cx="1122530" cy="266182"/>
+          </a:xfrm>
+          <a:prstGeom prst="straightConnector1">
+            <a:avLst/>
+          </a:prstGeom>
+          <a:ln w="28575">
+            <a:tailEnd type="triangle"/>
+          </a:ln>
+        </p:spPr>
+        <p:style>
+          <a:lnRef idx="2">
+            <a:schemeClr val="dk1"/>
+          </a:lnRef>
+          <a:fillRef idx="0">
+            <a:schemeClr val="dk1"/>
+          </a:fillRef>
+          <a:effectRef idx="1">
+            <a:schemeClr val="dk1"/>
+          </a:effectRef>
+          <a:fontRef idx="minor">
+            <a:schemeClr val="tx1"/>
+          </a:fontRef>
+        </p:style>
+      </p:cxnSp>
+      <p:sp>
+        <p:nvSpPr>
+          <p:cNvPr id="29" name="右大括号 28">
+            <a:extLst>
+              <a:ext uri="{FF2B5EF4-FFF2-40B4-BE49-F238E27FC236}">
+                <a16:creationId xmlns:a16="http://schemas.microsoft.com/office/drawing/2014/main" id="{D71AFA50-1C08-4D86-48D6-308672CA5867}"/>
+              </a:ext>
+            </a:extLst>
+          </p:cNvPr>
+          <p:cNvSpPr/>
+          <p:nvPr/>
+        </p:nvSpPr>
+        <p:spPr>
+          <a:xfrm rot="10800000">
+            <a:off x="6345197" y="2125337"/>
+            <a:ext cx="164882" cy="731519"/>
+          </a:xfrm>
+          <a:prstGeom prst="rightBrace">
+            <a:avLst>
+              <a:gd name="adj1" fmla="val 88333"/>
+              <a:gd name="adj2" fmla="val 50000"/>
+            </a:avLst>
+          </a:prstGeom>
+          <a:ln w="28575"/>
+        </p:spPr>
+        <p:style>
+          <a:lnRef idx="2">
+            <a:schemeClr val="dk1"/>
+          </a:lnRef>
+          <a:fillRef idx="0">
+            <a:schemeClr val="dk1"/>
+          </a:fillRef>
+          <a:effectRef idx="1">
+            <a:schemeClr val="dk1"/>
+          </a:effectRef>
+          <a:fontRef idx="minor">
+            <a:schemeClr val="tx1"/>
+          </a:fontRef>
+        </p:style>
+        <p:txBody>
+          <a:bodyPr rtlCol="0" anchor="ctr"/>
+          <a:lstStyle/>
+          <a:p>
+            <a:pPr algn="ctr"/>
+            <a:endParaRPr lang="en-US"/>
+          </a:p>
+        </p:txBody>
+      </p:sp>
+      <p:sp>
+        <p:nvSpPr>
+          <p:cNvPr id="30" name="文本框 29">
+            <a:extLst>
+              <a:ext uri="{FF2B5EF4-FFF2-40B4-BE49-F238E27FC236}">
+                <a16:creationId xmlns:a16="http://schemas.microsoft.com/office/drawing/2014/main" id="{8ECD9330-D170-9740-1019-FD82CD439CA5}"/>
+              </a:ext>
+            </a:extLst>
+          </p:cNvPr>
+          <p:cNvSpPr txBox="1"/>
+          <p:nvPr/>
+        </p:nvSpPr>
+        <p:spPr>
+          <a:xfrm>
+            <a:off x="5334729" y="2260263"/>
+            <a:ext cx="1065613" cy="461665"/>
+          </a:xfrm>
+          <a:prstGeom prst="rect">
+            <a:avLst/>
+          </a:prstGeom>
+          <a:noFill/>
+        </p:spPr>
+        <p:txBody>
+          <a:bodyPr wrap="none" rtlCol="0">
+            <a:spAutoFit/>
+          </a:bodyPr>
+          <a:lstStyle/>
+          <a:p>
+            <a:r>
+              <a:rPr lang="en-US" sz="2400" dirty="0"/>
+              <a:t>CTA_N</a:t>
+            </a:r>
+          </a:p>
+        </p:txBody>
+      </p:sp>
+      <p:sp>
+        <p:nvSpPr>
+          <p:cNvPr id="32" name="文本框 31">
+            <a:extLst>
+              <a:ext uri="{FF2B5EF4-FFF2-40B4-BE49-F238E27FC236}">
+                <a16:creationId xmlns:a16="http://schemas.microsoft.com/office/drawing/2014/main" id="{60BB36F1-0D23-19D1-660E-D4FF380EAF66}"/>
+              </a:ext>
+            </a:extLst>
+          </p:cNvPr>
+          <p:cNvSpPr txBox="1"/>
+          <p:nvPr/>
+        </p:nvSpPr>
+        <p:spPr>
+          <a:xfrm>
+            <a:off x="6802807" y="1454336"/>
+            <a:ext cx="1022331" cy="461665"/>
+          </a:xfrm>
+          <a:prstGeom prst="rect">
+            <a:avLst/>
+          </a:prstGeom>
+          <a:noFill/>
+        </p:spPr>
+        <p:txBody>
+          <a:bodyPr wrap="none" rtlCol="0">
+            <a:spAutoFit/>
+          </a:bodyPr>
+          <a:lstStyle/>
+          <a:p>
+            <a:r>
+              <a:rPr lang="en-US" sz="2400" dirty="0"/>
+              <a:t>CTA_K</a:t>
+            </a:r>
+          </a:p>
+        </p:txBody>
+      </p:sp>
+      <p:sp>
+        <p:nvSpPr>
+          <p:cNvPr id="33" name="右大括号 32">
+            <a:extLst>
+              <a:ext uri="{FF2B5EF4-FFF2-40B4-BE49-F238E27FC236}">
+                <a16:creationId xmlns:a16="http://schemas.microsoft.com/office/drawing/2014/main" id="{E0DBDBAA-D4DC-A7FB-D0DF-8D05ED70E3A9}"/>
+              </a:ext>
+            </a:extLst>
+          </p:cNvPr>
+          <p:cNvSpPr/>
+          <p:nvPr/>
+        </p:nvSpPr>
+        <p:spPr>
+          <a:xfrm rot="16200000">
+            <a:off x="7231535" y="1222171"/>
+            <a:ext cx="164882" cy="1440001"/>
+          </a:xfrm>
+          <a:prstGeom prst="rightBrace">
+            <a:avLst>
+              <a:gd name="adj1" fmla="val 88333"/>
+              <a:gd name="adj2" fmla="val 50000"/>
+            </a:avLst>
+          </a:prstGeom>
+          <a:ln w="28575"/>
+        </p:spPr>
+        <p:style>
+          <a:lnRef idx="2">
+            <a:schemeClr val="dk1"/>
+          </a:lnRef>
+          <a:fillRef idx="0">
+            <a:schemeClr val="dk1"/>
+          </a:fillRef>
+          <a:effectRef idx="1">
+            <a:schemeClr val="dk1"/>
+          </a:effectRef>
+          <a:fontRef idx="minor">
+            <a:schemeClr val="tx1"/>
+          </a:fontRef>
+        </p:style>
+        <p:txBody>
+          <a:bodyPr rtlCol="0" anchor="ctr"/>
+          <a:lstStyle/>
+          <a:p>
+            <a:pPr algn="ctr"/>
+            <a:endParaRPr lang="en-US"/>
+          </a:p>
+        </p:txBody>
+      </p:sp>
+      <p:graphicFrame>
+        <p:nvGraphicFramePr>
+          <p:cNvPr id="34" name="表格 33">
+            <a:extLst>
+              <a:ext uri="{FF2B5EF4-FFF2-40B4-BE49-F238E27FC236}">
+                <a16:creationId xmlns:a16="http://schemas.microsoft.com/office/drawing/2014/main" id="{1E9EBEE1-685F-E8DD-A52F-28AD93270987}"/>
+              </a:ext>
+            </a:extLst>
+          </p:cNvPr>
+          <p:cNvGraphicFramePr>
+            <a:graphicFrameLocks noGrp="1"/>
+          </p:cNvGraphicFramePr>
+          <p:nvPr>
+            <p:extLst>
+              <p:ext uri="{D42A27DB-BD31-4B8C-83A1-F6EECF244321}">
+                <p14:modId xmlns:p14="http://schemas.microsoft.com/office/powerpoint/2010/main" val="1799345265"/>
+              </p:ext>
+            </p:extLst>
+          </p:nvPr>
+        </p:nvGraphicFramePr>
+        <p:xfrm>
+          <a:off x="9479536" y="1964108"/>
+          <a:ext cx="720000" cy="1097280"/>
+        </p:xfrm>
+        <a:graphic>
+          <a:graphicData uri="http://schemas.openxmlformats.org/drawingml/2006/table">
+            <a:tbl>
+              <a:tblPr firstRow="1" bandRow="1">
+                <a:tableStyleId>{5940675A-B579-460E-94D1-54222C63F5DA}</a:tableStyleId>
+              </a:tblPr>
+              <a:tblGrid>
+                <a:gridCol w="360000">
+                  <a:extLst>
+                    <a:ext uri="{9D8B030D-6E8A-4147-A177-3AD203B41FA5}">
+                      <a16:colId xmlns:a16="http://schemas.microsoft.com/office/drawing/2014/main" val="2034969248"/>
+                    </a:ext>
+                  </a:extLst>
+                </a:gridCol>
+                <a:gridCol w="360000">
+                  <a:extLst>
+                    <a:ext uri="{9D8B030D-6E8A-4147-A177-3AD203B41FA5}">
+                      <a16:colId xmlns:a16="http://schemas.microsoft.com/office/drawing/2014/main" val="4259093849"/>
+                    </a:ext>
+                  </a:extLst>
+                </a:gridCol>
+              </a:tblGrid>
+              <a:tr h="360000">
+                <a:tc>
+                  <a:txBody>
+                    <a:bodyPr/>
+                    <a:lstStyle/>
+                    <a:p>
+                      <a:endParaRPr lang="en-US" dirty="0"/>
+                    </a:p>
+                  </a:txBody>
+                  <a:tcPr>
+                    <a:solidFill>
+                      <a:schemeClr val="accent2">
+                        <a:lumMod val="40000"/>
+                        <a:lumOff val="60000"/>
+                      </a:schemeClr>
+                    </a:solidFill>
+                  </a:tcPr>
+                </a:tc>
+                <a:tc>
+                  <a:txBody>
+                    <a:bodyPr/>
+                    <a:lstStyle/>
+                    <a:p>
+                      <a:endParaRPr lang="en-US" dirty="0"/>
+                    </a:p>
+                  </a:txBody>
+                  <a:tcPr>
+                    <a:lnB w="12700" cap="flat" cmpd="sng" algn="ctr">
+                      <a:solidFill>
+                        <a:schemeClr val="tx1"/>
+                      </a:solidFill>
+                      <a:prstDash val="solid"/>
+                      <a:round/>
+                      <a:headEnd type="none" w="med" len="med"/>
+                      <a:tailEnd type="none" w="med" len="med"/>
+                    </a:lnB>
+                    <a:solidFill>
+                      <a:schemeClr val="accent6">
+                        <a:lumMod val="40000"/>
+                        <a:lumOff val="60000"/>
+                      </a:schemeClr>
+                    </a:solidFill>
+                  </a:tcPr>
+                </a:tc>
+                <a:extLst>
+                  <a:ext uri="{0D108BD9-81ED-4DB2-BD59-A6C34878D82A}">
+                    <a16:rowId xmlns:a16="http://schemas.microsoft.com/office/drawing/2014/main" val="1340743427"/>
+                  </a:ext>
+                </a:extLst>
+              </a:tr>
+              <a:tr h="360000">
+                <a:tc>
+                  <a:txBody>
+                    <a:bodyPr/>
+                    <a:lstStyle/>
+                    <a:p>
+                      <a:endParaRPr lang="en-US" dirty="0"/>
+                    </a:p>
+                  </a:txBody>
+                  <a:tcPr>
+                    <a:lnR w="12700" cap="flat" cmpd="sng" algn="ctr">
+                      <a:solidFill>
+                        <a:schemeClr val="tx1"/>
+                      </a:solidFill>
+                      <a:prstDash val="solid"/>
+                      <a:round/>
+                      <a:headEnd type="none" w="med" len="med"/>
+                      <a:tailEnd type="none" w="med" len="med"/>
+                    </a:lnR>
+                    <a:solidFill>
+                      <a:schemeClr val="accent6">
+                        <a:lumMod val="40000"/>
+                        <a:lumOff val="60000"/>
+                      </a:schemeClr>
+                    </a:solidFill>
+                  </a:tcPr>
+                </a:tc>
+                <a:tc>
+                  <a:txBody>
+                    <a:bodyPr/>
+                    <a:lstStyle/>
+                    <a:p>
+                      <a:endParaRPr lang="en-US" dirty="0"/>
+                    </a:p>
+                  </a:txBody>
+                  <a:tcPr>
+                    <a:lnL w="12700" cap="flat" cmpd="sng" algn="ctr">
+                      <a:solidFill>
+                        <a:schemeClr val="tx1"/>
+                      </a:solidFill>
+                      <a:prstDash val="solid"/>
+                      <a:round/>
+                      <a:headEnd type="none" w="med" len="med"/>
+                      <a:tailEnd type="none" w="med" len="med"/>
+                    </a:lnL>
+                    <a:lnR w="12700" cap="flat" cmpd="sng" algn="ctr">
+                      <a:solidFill>
+                        <a:schemeClr val="tx1"/>
+                      </a:solidFill>
+                      <a:prstDash val="solid"/>
+                      <a:round/>
+                      <a:headEnd type="none" w="med" len="med"/>
+                      <a:tailEnd type="none" w="med" len="med"/>
+                    </a:lnR>
+                    <a:lnT w="12700" cap="flat" cmpd="sng" algn="ctr">
+                      <a:solidFill>
+                        <a:schemeClr val="tx1"/>
+                      </a:solidFill>
+                      <a:prstDash val="solid"/>
+                      <a:round/>
+                      <a:headEnd type="none" w="med" len="med"/>
+                      <a:tailEnd type="none" w="med" len="med"/>
+                    </a:lnT>
+                    <a:lnB w="12700" cap="flat" cmpd="sng" algn="ctr">
+                      <a:solidFill>
+                        <a:schemeClr val="tx1"/>
+                      </a:solidFill>
+                      <a:prstDash val="solid"/>
+                      <a:round/>
+                      <a:headEnd type="none" w="med" len="med"/>
+                      <a:tailEnd type="none" w="med" len="med"/>
+                    </a:lnB>
+                    <a:solidFill>
+                      <a:schemeClr val="accent1">
+                        <a:lumMod val="40000"/>
+                        <a:lumOff val="60000"/>
+                      </a:schemeClr>
+                    </a:solidFill>
+                  </a:tcPr>
+                </a:tc>
+                <a:extLst>
+                  <a:ext uri="{0D108BD9-81ED-4DB2-BD59-A6C34878D82A}">
+                    <a16:rowId xmlns:a16="http://schemas.microsoft.com/office/drawing/2014/main" val="4081798692"/>
+                  </a:ext>
+                </a:extLst>
+              </a:tr>
+              <a:tr h="360000">
+                <a:tc>
+                  <a:txBody>
+                    <a:bodyPr/>
+                    <a:lstStyle/>
+                    <a:p>
+                      <a:endParaRPr lang="en-US" dirty="0"/>
+                    </a:p>
+                  </a:txBody>
+                  <a:tcPr>
+                    <a:solidFill>
+                      <a:schemeClr val="accent2">
+                        <a:lumMod val="40000"/>
+                        <a:lumOff val="60000"/>
+                      </a:schemeClr>
+                    </a:solidFill>
+                  </a:tcPr>
+                </a:tc>
+                <a:tc>
+                  <a:txBody>
+                    <a:bodyPr/>
+                    <a:lstStyle/>
+                    <a:p>
+                      <a:endParaRPr lang="en-US" dirty="0"/>
+                    </a:p>
+                  </a:txBody>
+                  <a:tcPr>
+                    <a:lnT w="12700" cap="flat" cmpd="sng" algn="ctr">
+                      <a:solidFill>
+                        <a:schemeClr val="tx1"/>
+                      </a:solidFill>
+                      <a:prstDash val="solid"/>
+                      <a:round/>
+                      <a:headEnd type="none" w="med" len="med"/>
+                      <a:tailEnd type="none" w="med" len="med"/>
+                    </a:lnT>
+                    <a:solidFill>
+                      <a:schemeClr val="accent6">
+                        <a:lumMod val="40000"/>
+                        <a:lumOff val="60000"/>
+                      </a:schemeClr>
+                    </a:solidFill>
+                  </a:tcPr>
+                </a:tc>
+                <a:extLst>
+                  <a:ext uri="{0D108BD9-81ED-4DB2-BD59-A6C34878D82A}">
+                    <a16:rowId xmlns:a16="http://schemas.microsoft.com/office/drawing/2014/main" val="3517455808"/>
+                  </a:ext>
+                </a:extLst>
+              </a:tr>
+            </a:tbl>
+          </a:graphicData>
+        </a:graphic>
+      </p:graphicFrame>
+      <p:sp>
+        <p:nvSpPr>
+          <p:cNvPr id="35" name="文本框 34">
+            <a:extLst>
+              <a:ext uri="{FF2B5EF4-FFF2-40B4-BE49-F238E27FC236}">
+                <a16:creationId xmlns:a16="http://schemas.microsoft.com/office/drawing/2014/main" id="{27190E28-7625-F194-9935-0B43674AB930}"/>
+              </a:ext>
+            </a:extLst>
+          </p:cNvPr>
+          <p:cNvSpPr txBox="1"/>
+          <p:nvPr/>
+        </p:nvSpPr>
+        <p:spPr>
+          <a:xfrm>
+            <a:off x="9447407" y="3663599"/>
+            <a:ext cx="752129" cy="461665"/>
+          </a:xfrm>
+          <a:prstGeom prst="rect">
+            <a:avLst/>
+          </a:prstGeom>
+          <a:noFill/>
+        </p:spPr>
+        <p:txBody>
+          <a:bodyPr wrap="none" rtlCol="0">
+            <a:spAutoFit/>
+          </a:bodyPr>
+          <a:lstStyle/>
+          <a:p>
+            <a:r>
+              <a:rPr lang="en-US" sz="2400" dirty="0"/>
+              <a:t>Grid</a:t>
+            </a:r>
+          </a:p>
+        </p:txBody>
+      </p:sp>
+      <p:sp>
+        <p:nvSpPr>
+          <p:cNvPr id="36" name="右大括号 35">
+            <a:extLst>
+              <a:ext uri="{FF2B5EF4-FFF2-40B4-BE49-F238E27FC236}">
+                <a16:creationId xmlns:a16="http://schemas.microsoft.com/office/drawing/2014/main" id="{A0809E15-AFA3-86F3-5F9E-D72C81E40138}"/>
+              </a:ext>
+            </a:extLst>
+          </p:cNvPr>
+          <p:cNvSpPr/>
+          <p:nvPr/>
+        </p:nvSpPr>
+        <p:spPr>
+          <a:xfrm rot="10800000">
+            <a:off x="9248693" y="1983193"/>
+            <a:ext cx="164882" cy="1078195"/>
+          </a:xfrm>
+          <a:prstGeom prst="rightBrace">
+            <a:avLst>
+              <a:gd name="adj1" fmla="val 88333"/>
+              <a:gd name="adj2" fmla="val 50000"/>
+            </a:avLst>
+          </a:prstGeom>
+          <a:ln w="28575"/>
+        </p:spPr>
+        <p:style>
+          <a:lnRef idx="2">
+            <a:schemeClr val="dk1"/>
+          </a:lnRef>
+          <a:fillRef idx="0">
+            <a:schemeClr val="dk1"/>
+          </a:fillRef>
+          <a:effectRef idx="1">
+            <a:schemeClr val="dk1"/>
+          </a:effectRef>
+          <a:fontRef idx="minor">
+            <a:schemeClr val="tx1"/>
+          </a:fontRef>
+        </p:style>
+        <p:txBody>
+          <a:bodyPr rtlCol="0" anchor="ctr"/>
+          <a:lstStyle/>
+          <a:p>
+            <a:pPr algn="ctr"/>
+            <a:endParaRPr lang="en-US"/>
+          </a:p>
+        </p:txBody>
+      </p:sp>
+      <p:sp>
+        <p:nvSpPr>
+          <p:cNvPr id="37" name="文本框 36">
+            <a:extLst>
+              <a:ext uri="{FF2B5EF4-FFF2-40B4-BE49-F238E27FC236}">
+                <a16:creationId xmlns:a16="http://schemas.microsoft.com/office/drawing/2014/main" id="{5F428061-8164-EF1C-E404-05C5D7FECA52}"/>
+              </a:ext>
+            </a:extLst>
+          </p:cNvPr>
+          <p:cNvSpPr txBox="1"/>
+          <p:nvPr/>
+        </p:nvSpPr>
+        <p:spPr>
+          <a:xfrm>
+            <a:off x="8174896" y="2328812"/>
+            <a:ext cx="1136850" cy="369332"/>
+          </a:xfrm>
+          <a:prstGeom prst="rect">
+            <a:avLst/>
+          </a:prstGeom>
+          <a:noFill/>
+        </p:spPr>
+        <p:txBody>
+          <a:bodyPr wrap="none" rtlCol="0">
+            <a:spAutoFit/>
+          </a:bodyPr>
+          <a:lstStyle/>
+          <a:p>
+            <a:r>
+              <a:rPr lang="en-US" dirty="0"/>
+              <a:t>gridDim.x</a:t>
+            </a:r>
+          </a:p>
+        </p:txBody>
+      </p:sp>
+      <p:sp>
+        <p:nvSpPr>
+          <p:cNvPr id="38" name="文本框 37">
+            <a:extLst>
+              <a:ext uri="{FF2B5EF4-FFF2-40B4-BE49-F238E27FC236}">
+                <a16:creationId xmlns:a16="http://schemas.microsoft.com/office/drawing/2014/main" id="{238AD61B-91AC-9F89-7F97-061083CA963E}"/>
+              </a:ext>
+            </a:extLst>
+          </p:cNvPr>
+          <p:cNvSpPr txBox="1"/>
+          <p:nvPr/>
+        </p:nvSpPr>
+        <p:spPr>
+          <a:xfrm>
+            <a:off x="9289834" y="1378965"/>
+            <a:ext cx="1121654" cy="369332"/>
+          </a:xfrm>
+          <a:prstGeom prst="rect">
+            <a:avLst/>
+          </a:prstGeom>
+          <a:noFill/>
+        </p:spPr>
+        <p:txBody>
+          <a:bodyPr wrap="none" rtlCol="0">
+            <a:spAutoFit/>
+          </a:bodyPr>
+          <a:lstStyle/>
+          <a:p>
+            <a:r>
+              <a:rPr lang="en-US" dirty="0"/>
+              <a:t>gridDim.y</a:t>
+            </a:r>
+          </a:p>
+        </p:txBody>
+      </p:sp>
+      <p:sp>
+        <p:nvSpPr>
+          <p:cNvPr id="39" name="右大括号 38">
+            <a:extLst>
+              <a:ext uri="{FF2B5EF4-FFF2-40B4-BE49-F238E27FC236}">
+                <a16:creationId xmlns:a16="http://schemas.microsoft.com/office/drawing/2014/main" id="{CF026A9C-2B76-8A56-1D18-97F59FBD7077}"/>
+              </a:ext>
+            </a:extLst>
+          </p:cNvPr>
+          <p:cNvSpPr/>
+          <p:nvPr/>
+        </p:nvSpPr>
+        <p:spPr>
+          <a:xfrm rot="16200000">
+            <a:off x="9768220" y="1478821"/>
+            <a:ext cx="164882" cy="697755"/>
+          </a:xfrm>
+          <a:prstGeom prst="rightBrace">
+            <a:avLst>
+              <a:gd name="adj1" fmla="val 88333"/>
+              <a:gd name="adj2" fmla="val 50000"/>
+            </a:avLst>
+          </a:prstGeom>
+          <a:ln w="28575"/>
+        </p:spPr>
+        <p:style>
+          <a:lnRef idx="2">
+            <a:schemeClr val="dk1"/>
+          </a:lnRef>
+          <a:fillRef idx="0">
+            <a:schemeClr val="dk1"/>
+          </a:fillRef>
+          <a:effectRef idx="1">
+            <a:schemeClr val="dk1"/>
+          </a:effectRef>
+          <a:fontRef idx="minor">
+            <a:schemeClr val="tx1"/>
+          </a:fontRef>
+        </p:style>
+        <p:txBody>
+          <a:bodyPr rtlCol="0" anchor="ctr"/>
+          <a:lstStyle/>
+          <a:p>
+            <a:pPr algn="ctr"/>
+            <a:endParaRPr lang="en-US"/>
+          </a:p>
+        </p:txBody>
+      </p:sp>
+    </p:spTree>
+    <p:extLst>
+      <p:ext uri="{BB962C8B-B14F-4D97-AF65-F5344CB8AC3E}">
+        <p14:creationId xmlns:p14="http://schemas.microsoft.com/office/powerpoint/2010/main" val="3327017953"/>
+      </p:ext>
+    </p:extLst>
+  </p:cSld>
+  <p:clrMapOvr>
+    <a:masterClrMapping/>
+  </p:clrMapOvr>
+</p:sld>
+</file>
+
+<file path=ppt/slides/slide3.xml><?xml version="1.0" encoding="utf-8"?>
+<p:sld xmlns:a="http://schemas.openxmlformats.org/drawingml/2006/main" xmlns:r="http://schemas.openxmlformats.org/officeDocument/2006/relationships" xmlns:p="http://schemas.openxmlformats.org/presentationml/2006/main">
+  <p:cSld>
+    <p:spTree>
+      <p:nvGrpSpPr>
+        <p:cNvPr id="1" name="">
+          <a:extLst>
+            <a:ext uri="{FF2B5EF4-FFF2-40B4-BE49-F238E27FC236}">
+              <a16:creationId xmlns:a16="http://schemas.microsoft.com/office/drawing/2014/main" id="{A8256289-5932-22A4-F0BE-F525D9DDC46C}"/>
+            </a:ext>
+          </a:extLst>
+        </p:cNvPr>
+        <p:cNvGrpSpPr/>
+        <p:nvPr/>
+      </p:nvGrpSpPr>
+      <p:grpSpPr>
+        <a:xfrm>
+          <a:off x="0" y="0"/>
+          <a:ext cx="0" cy="0"/>
+          <a:chOff x="0" y="0"/>
+          <a:chExt cx="0" cy="0"/>
+        </a:xfrm>
+      </p:grpSpPr>
+      <p:graphicFrame>
+        <p:nvGraphicFramePr>
+          <p:cNvPr id="2" name="表格 1">
+            <a:extLst>
+              <a:ext uri="{FF2B5EF4-FFF2-40B4-BE49-F238E27FC236}">
+                <a16:creationId xmlns:a16="http://schemas.microsoft.com/office/drawing/2014/main" id="{0B8D2C7E-6557-BFA5-B4BC-B1BF26288EFF}"/>
+              </a:ext>
+            </a:extLst>
+          </p:cNvPr>
+          <p:cNvGraphicFramePr>
+            <a:graphicFrameLocks noGrp="1"/>
+          </p:cNvGraphicFramePr>
+          <p:nvPr>
+            <p:extLst>
+              <p:ext uri="{D42A27DB-BD31-4B8C-83A1-F6EECF244321}">
+                <p14:modId xmlns:p14="http://schemas.microsoft.com/office/powerpoint/2010/main" val="3521626234"/>
+              </p:ext>
+            </p:extLst>
+          </p:nvPr>
+        </p:nvGraphicFramePr>
+        <p:xfrm>
+          <a:off x="636606" y="1393901"/>
+          <a:ext cx="3877248" cy="1477230"/>
+        </p:xfrm>
+        <a:graphic>
+          <a:graphicData uri="http://schemas.openxmlformats.org/drawingml/2006/table">
+            <a:tbl>
+              <a:tblPr firstRow="1" bandRow="1">
+                <a:tableStyleId>{5940675A-B579-460E-94D1-54222C63F5DA}</a:tableStyleId>
+              </a:tblPr>
+              <a:tblGrid>
+                <a:gridCol w="484656">
+                  <a:extLst>
+                    <a:ext uri="{9D8B030D-6E8A-4147-A177-3AD203B41FA5}">
+                      <a16:colId xmlns:a16="http://schemas.microsoft.com/office/drawing/2014/main" val="2034969248"/>
+                    </a:ext>
+                  </a:extLst>
+                </a:gridCol>
+                <a:gridCol w="484656">
+                  <a:extLst>
+                    <a:ext uri="{9D8B030D-6E8A-4147-A177-3AD203B41FA5}">
+                      <a16:colId xmlns:a16="http://schemas.microsoft.com/office/drawing/2014/main" val="4259093849"/>
+                    </a:ext>
+                  </a:extLst>
+                </a:gridCol>
+                <a:gridCol w="484656">
+                  <a:extLst>
+                    <a:ext uri="{9D8B030D-6E8A-4147-A177-3AD203B41FA5}">
+                      <a16:colId xmlns:a16="http://schemas.microsoft.com/office/drawing/2014/main" val="1669695598"/>
+                    </a:ext>
+                  </a:extLst>
+                </a:gridCol>
+                <a:gridCol w="484656">
+                  <a:extLst>
+                    <a:ext uri="{9D8B030D-6E8A-4147-A177-3AD203B41FA5}">
+                      <a16:colId xmlns:a16="http://schemas.microsoft.com/office/drawing/2014/main" val="3881258515"/>
+                    </a:ext>
+                  </a:extLst>
+                </a:gridCol>
+                <a:gridCol w="484656">
+                  <a:extLst>
+                    <a:ext uri="{9D8B030D-6E8A-4147-A177-3AD203B41FA5}">
+                      <a16:colId xmlns:a16="http://schemas.microsoft.com/office/drawing/2014/main" val="362548930"/>
+                    </a:ext>
+                  </a:extLst>
+                </a:gridCol>
+                <a:gridCol w="484656">
+                  <a:extLst>
+                    <a:ext uri="{9D8B030D-6E8A-4147-A177-3AD203B41FA5}">
+                      <a16:colId xmlns:a16="http://schemas.microsoft.com/office/drawing/2014/main" val="2625984587"/>
+                    </a:ext>
+                  </a:extLst>
+                </a:gridCol>
+                <a:gridCol w="484656">
+                  <a:extLst>
+                    <a:ext uri="{9D8B030D-6E8A-4147-A177-3AD203B41FA5}">
+                      <a16:colId xmlns:a16="http://schemas.microsoft.com/office/drawing/2014/main" val="3336674363"/>
+                    </a:ext>
+                  </a:extLst>
+                </a:gridCol>
+                <a:gridCol w="484656">
+                  <a:extLst>
+                    <a:ext uri="{9D8B030D-6E8A-4147-A177-3AD203B41FA5}">
+                      <a16:colId xmlns:a16="http://schemas.microsoft.com/office/drawing/2014/main" val="3089910086"/>
+                    </a:ext>
+                  </a:extLst>
+                </a:gridCol>
+              </a:tblGrid>
+              <a:tr h="246205">
+                <a:tc>
+                  <a:txBody>
+                    <a:bodyPr/>
+                    <a:lstStyle/>
+                    <a:p>
+                      <a:r>
+                        <a:rPr lang="en-US" sz="1200" dirty="0"/>
+                        <a:t>(0,0)</a:t>
+                      </a:r>
+                    </a:p>
+                  </a:txBody>
+                  <a:tcPr marL="61551" marR="61551" marT="30776" marB="30776">
+                    <a:solidFill>
+                      <a:schemeClr val="accent2">
+                        <a:lumMod val="40000"/>
+                        <a:lumOff val="60000"/>
+                      </a:schemeClr>
+                    </a:solidFill>
+                  </a:tcPr>
+                </a:tc>
+                <a:tc>
+                  <a:txBody>
+                    <a:bodyPr/>
+                    <a:lstStyle/>
+                    <a:p>
+                      <a:pPr marL="0" marR="0" lvl="0" indent="0" algn="l" defTabSz="914400" rtl="0" eaLnBrk="1" fontAlgn="auto" latinLnBrk="0" hangingPunct="1">
+                        <a:lnSpc>
+                          <a:spcPct val="100000"/>
+                        </a:lnSpc>
+                        <a:spcBef>
+                          <a:spcPts val="0"/>
+                        </a:spcBef>
+                        <a:spcAft>
+                          <a:spcPts val="0"/>
+                        </a:spcAft>
+                        <a:buClrTx/>
+                        <a:buSzTx/>
+                        <a:buFontTx/>
+                        <a:buNone/>
+                        <a:tabLst/>
+                        <a:defRPr/>
+                      </a:pPr>
+                      <a:r>
+                        <a:rPr lang="en-US" sz="1200" dirty="0"/>
+                        <a:t>(0,1)</a:t>
+                      </a:r>
+                    </a:p>
+                  </a:txBody>
+                  <a:tcPr marL="61551" marR="61551" marT="30776" marB="30776">
+                    <a:solidFill>
+                      <a:schemeClr val="accent2">
+                        <a:lumMod val="40000"/>
+                        <a:lumOff val="60000"/>
+                      </a:schemeClr>
+                    </a:solidFill>
+                  </a:tcPr>
+                </a:tc>
+                <a:tc>
+                  <a:txBody>
+                    <a:bodyPr/>
+                    <a:lstStyle/>
+                    <a:p>
+                      <a:r>
+                        <a:rPr lang="en-US" sz="1200" dirty="0"/>
+                        <a:t>(0,2)</a:t>
+                      </a:r>
+                    </a:p>
+                  </a:txBody>
+                  <a:tcPr marL="61551" marR="61551" marT="30776" marB="30776">
+                    <a:solidFill>
+                      <a:schemeClr val="accent2">
+                        <a:lumMod val="40000"/>
+                        <a:lumOff val="60000"/>
+                      </a:schemeClr>
+                    </a:solidFill>
+                  </a:tcPr>
+                </a:tc>
+                <a:tc>
+                  <a:txBody>
+                    <a:bodyPr/>
+                    <a:lstStyle/>
+                    <a:p>
+                      <a:r>
+                        <a:rPr lang="en-US" sz="1200" dirty="0"/>
+                        <a:t>(0,3)</a:t>
+                      </a:r>
+                    </a:p>
+                  </a:txBody>
+                  <a:tcPr marL="61551" marR="61551" marT="30776" marB="30776">
+                    <a:solidFill>
+                      <a:schemeClr val="accent2">
+                        <a:lumMod val="40000"/>
+                        <a:lumOff val="60000"/>
+                      </a:schemeClr>
+                    </a:solidFill>
+                  </a:tcPr>
+                </a:tc>
+                <a:tc>
+                  <a:txBody>
+                    <a:bodyPr/>
+                    <a:lstStyle/>
+                    <a:p>
+                      <a:r>
+                        <a:rPr lang="en-US" sz="1200" dirty="0"/>
+                        <a:t>(0,4)</a:t>
+                      </a:r>
+                    </a:p>
+                  </a:txBody>
+                  <a:tcPr marL="61551" marR="61551" marT="30776" marB="30776">
+                    <a:solidFill>
+                      <a:schemeClr val="accent6">
+                        <a:lumMod val="40000"/>
+                        <a:lumOff val="60000"/>
+                      </a:schemeClr>
+                    </a:solidFill>
+                  </a:tcPr>
+                </a:tc>
+                <a:tc>
+                  <a:txBody>
+                    <a:bodyPr/>
+                    <a:lstStyle/>
+                    <a:p>
+                      <a:r>
+                        <a:rPr lang="en-US" sz="1200" dirty="0"/>
+                        <a:t>(0,5)</a:t>
+                      </a:r>
+                    </a:p>
+                  </a:txBody>
+                  <a:tcPr marL="61551" marR="61551" marT="30776" marB="30776">
+                    <a:solidFill>
+                      <a:schemeClr val="accent6">
+                        <a:lumMod val="40000"/>
+                        <a:lumOff val="60000"/>
+                      </a:schemeClr>
+                    </a:solidFill>
+                  </a:tcPr>
+                </a:tc>
+                <a:tc>
+                  <a:txBody>
+                    <a:bodyPr/>
+                    <a:lstStyle/>
+                    <a:p>
+                      <a:r>
+                        <a:rPr lang="en-US" sz="1200" dirty="0"/>
+                        <a:t>(0,6)</a:t>
+                      </a:r>
+                    </a:p>
+                  </a:txBody>
+                  <a:tcPr marL="61551" marR="61551" marT="30776" marB="30776">
+                    <a:solidFill>
+                      <a:schemeClr val="accent6">
+                        <a:lumMod val="40000"/>
+                        <a:lumOff val="60000"/>
+                      </a:schemeClr>
+                    </a:solidFill>
+                  </a:tcPr>
+                </a:tc>
+                <a:tc>
+                  <a:txBody>
+                    <a:bodyPr/>
+                    <a:lstStyle/>
+                    <a:p>
+                      <a:r>
+                        <a:rPr lang="en-US" sz="1200" dirty="0"/>
+                        <a:t>(0,7)</a:t>
+                      </a:r>
+                    </a:p>
+                  </a:txBody>
+                  <a:tcPr marL="61551" marR="61551" marT="30776" marB="30776">
+                    <a:solidFill>
+                      <a:schemeClr val="accent6">
+                        <a:lumMod val="40000"/>
+                        <a:lumOff val="60000"/>
+                      </a:schemeClr>
+                    </a:solidFill>
+                  </a:tcPr>
+                </a:tc>
+                <a:extLst>
+                  <a:ext uri="{0D108BD9-81ED-4DB2-BD59-A6C34878D82A}">
+                    <a16:rowId xmlns:a16="http://schemas.microsoft.com/office/drawing/2014/main" val="1340743427"/>
+                  </a:ext>
+                </a:extLst>
+              </a:tr>
+              <a:tr h="246205">
+                <a:tc>
+                  <a:txBody>
+                    <a:bodyPr/>
+                    <a:lstStyle/>
+                    <a:p>
+                      <a:r>
+                        <a:rPr lang="en-US" sz="1200" dirty="0"/>
+                        <a:t>(1,0)</a:t>
+                      </a:r>
+                    </a:p>
+                  </a:txBody>
+                  <a:tcPr marL="61551" marR="61551" marT="30776" marB="30776">
+                    <a:solidFill>
+                      <a:schemeClr val="accent2">
+                        <a:lumMod val="40000"/>
+                        <a:lumOff val="60000"/>
+                      </a:schemeClr>
+                    </a:solidFill>
+                  </a:tcPr>
+                </a:tc>
+                <a:tc>
+                  <a:txBody>
+                    <a:bodyPr/>
+                    <a:lstStyle/>
+                    <a:p>
+                      <a:pPr marL="0" marR="0" lvl="0" indent="0" algn="l" defTabSz="914400" rtl="0" eaLnBrk="1" fontAlgn="auto" latinLnBrk="0" hangingPunct="1">
+                        <a:lnSpc>
+                          <a:spcPct val="100000"/>
+                        </a:lnSpc>
+                        <a:spcBef>
+                          <a:spcPts val="0"/>
+                        </a:spcBef>
+                        <a:spcAft>
+                          <a:spcPts val="0"/>
+                        </a:spcAft>
+                        <a:buClrTx/>
+                        <a:buSzTx/>
+                        <a:buFontTx/>
+                        <a:buNone/>
+                        <a:tabLst/>
+                        <a:defRPr/>
+                      </a:pPr>
+                      <a:r>
+                        <a:rPr lang="en-US" sz="1200" dirty="0"/>
+                        <a:t>(1,1)</a:t>
+                      </a:r>
+                    </a:p>
+                  </a:txBody>
+                  <a:tcPr marL="61551" marR="61551" marT="30776" marB="30776">
+                    <a:solidFill>
+                      <a:schemeClr val="accent2">
+                        <a:lumMod val="40000"/>
+                        <a:lumOff val="60000"/>
+                      </a:schemeClr>
+                    </a:solidFill>
+                  </a:tcPr>
+                </a:tc>
+                <a:tc>
+                  <a:txBody>
+                    <a:bodyPr/>
+                    <a:lstStyle/>
+                    <a:p>
+                      <a:r>
+                        <a:rPr lang="en-US" sz="1200" dirty="0"/>
+                        <a:t>(1,2)</a:t>
+                      </a:r>
+                    </a:p>
+                  </a:txBody>
+                  <a:tcPr marL="61551" marR="61551" marT="30776" marB="30776">
+                    <a:solidFill>
+                      <a:schemeClr val="accent2">
+                        <a:lumMod val="40000"/>
+                        <a:lumOff val="60000"/>
+                      </a:schemeClr>
+                    </a:solidFill>
+                  </a:tcPr>
+                </a:tc>
+                <a:tc>
+                  <a:txBody>
+                    <a:bodyPr/>
+                    <a:lstStyle/>
+                    <a:p>
+                      <a:r>
+                        <a:rPr lang="en-US" sz="1200" dirty="0"/>
+                        <a:t>(1,3)</a:t>
+                      </a:r>
+                    </a:p>
+                  </a:txBody>
+                  <a:tcPr marL="61551" marR="61551" marT="30776" marB="30776">
+                    <a:solidFill>
+                      <a:schemeClr val="accent2">
+                        <a:lumMod val="40000"/>
+                        <a:lumOff val="60000"/>
+                      </a:schemeClr>
+                    </a:solidFill>
+                  </a:tcPr>
+                </a:tc>
+                <a:tc>
+                  <a:txBody>
+                    <a:bodyPr/>
+                    <a:lstStyle/>
+                    <a:p>
+                      <a:r>
+                        <a:rPr lang="en-US" sz="1200" dirty="0"/>
+                        <a:t>(1,4)</a:t>
+                      </a:r>
+                    </a:p>
+                  </a:txBody>
+                  <a:tcPr marL="61551" marR="61551" marT="30776" marB="30776">
+                    <a:solidFill>
+                      <a:schemeClr val="accent6">
+                        <a:lumMod val="40000"/>
+                        <a:lumOff val="60000"/>
+                      </a:schemeClr>
+                    </a:solidFill>
+                  </a:tcPr>
+                </a:tc>
+                <a:tc>
+                  <a:txBody>
+                    <a:bodyPr/>
+                    <a:lstStyle/>
+                    <a:p>
+                      <a:r>
+                        <a:rPr lang="en-US" sz="1200" dirty="0"/>
+                        <a:t>(1,5)</a:t>
+                      </a:r>
+                    </a:p>
+                  </a:txBody>
+                  <a:tcPr marL="61551" marR="61551" marT="30776" marB="30776">
+                    <a:solidFill>
+                      <a:schemeClr val="accent6">
+                        <a:lumMod val="40000"/>
+                        <a:lumOff val="60000"/>
+                      </a:schemeClr>
+                    </a:solidFill>
+                  </a:tcPr>
+                </a:tc>
+                <a:tc>
+                  <a:txBody>
+                    <a:bodyPr/>
+                    <a:lstStyle/>
+                    <a:p>
+                      <a:r>
+                        <a:rPr lang="en-US" sz="1200" dirty="0"/>
+                        <a:t>(1,6)</a:t>
+                      </a:r>
+                    </a:p>
+                  </a:txBody>
+                  <a:tcPr marL="61551" marR="61551" marT="30776" marB="30776">
+                    <a:solidFill>
+                      <a:schemeClr val="accent6">
+                        <a:lumMod val="40000"/>
+                        <a:lumOff val="60000"/>
+                      </a:schemeClr>
+                    </a:solidFill>
+                  </a:tcPr>
+                </a:tc>
+                <a:tc>
+                  <a:txBody>
+                    <a:bodyPr/>
+                    <a:lstStyle/>
+                    <a:p>
+                      <a:r>
+                        <a:rPr lang="en-US" sz="1200" dirty="0"/>
+                        <a:t>(1,7)</a:t>
+                      </a:r>
+                    </a:p>
+                  </a:txBody>
+                  <a:tcPr marL="61551" marR="61551" marT="30776" marB="30776">
+                    <a:solidFill>
+                      <a:schemeClr val="accent6">
+                        <a:lumMod val="40000"/>
+                        <a:lumOff val="60000"/>
+                      </a:schemeClr>
+                    </a:solidFill>
+                  </a:tcPr>
+                </a:tc>
+                <a:extLst>
+                  <a:ext uri="{0D108BD9-81ED-4DB2-BD59-A6C34878D82A}">
+                    <a16:rowId xmlns:a16="http://schemas.microsoft.com/office/drawing/2014/main" val="4081798692"/>
+                  </a:ext>
+                </a:extLst>
+              </a:tr>
+              <a:tr h="246205">
+                <a:tc>
+                  <a:txBody>
+                    <a:bodyPr/>
+                    <a:lstStyle/>
+                    <a:p>
+                      <a:r>
+                        <a:rPr lang="en-US" sz="1200" dirty="0"/>
+                        <a:t>(2,0)</a:t>
+                      </a:r>
+                    </a:p>
+                  </a:txBody>
+                  <a:tcPr marL="61551" marR="61551" marT="30776" marB="30776">
+                    <a:solidFill>
+                      <a:schemeClr val="accent6">
+                        <a:lumMod val="40000"/>
+                        <a:lumOff val="60000"/>
+                      </a:schemeClr>
+                    </a:solidFill>
+                  </a:tcPr>
+                </a:tc>
+                <a:tc>
+                  <a:txBody>
+                    <a:bodyPr/>
+                    <a:lstStyle/>
+                    <a:p>
+                      <a:pPr marL="0" marR="0" lvl="0" indent="0" algn="l" defTabSz="914400" rtl="0" eaLnBrk="1" fontAlgn="auto" latinLnBrk="0" hangingPunct="1">
+                        <a:lnSpc>
+                          <a:spcPct val="100000"/>
+                        </a:lnSpc>
+                        <a:spcBef>
+                          <a:spcPts val="0"/>
+                        </a:spcBef>
+                        <a:spcAft>
+                          <a:spcPts val="0"/>
+                        </a:spcAft>
+                        <a:buClrTx/>
+                        <a:buSzTx/>
+                        <a:buFontTx/>
+                        <a:buNone/>
+                        <a:tabLst/>
+                        <a:defRPr/>
+                      </a:pPr>
+                      <a:r>
+                        <a:rPr lang="en-US" sz="1200" dirty="0"/>
+                        <a:t>(2,1)</a:t>
+                      </a:r>
+                    </a:p>
+                  </a:txBody>
+                  <a:tcPr marL="61551" marR="61551" marT="30776" marB="30776">
+                    <a:solidFill>
+                      <a:schemeClr val="accent6">
+                        <a:lumMod val="40000"/>
+                        <a:lumOff val="60000"/>
+                      </a:schemeClr>
+                    </a:solidFill>
+                  </a:tcPr>
+                </a:tc>
+                <a:tc>
+                  <a:txBody>
+                    <a:bodyPr/>
+                    <a:lstStyle/>
+                    <a:p>
+                      <a:r>
+                        <a:rPr lang="en-US" sz="1200" dirty="0"/>
+                        <a:t>(2,2)</a:t>
+                      </a:r>
+                    </a:p>
+                  </a:txBody>
+                  <a:tcPr marL="61551" marR="61551" marT="30776" marB="30776">
+                    <a:solidFill>
+                      <a:schemeClr val="accent6">
+                        <a:lumMod val="40000"/>
+                        <a:lumOff val="60000"/>
+                      </a:schemeClr>
+                    </a:solidFill>
+                  </a:tcPr>
+                </a:tc>
+                <a:tc>
+                  <a:txBody>
+                    <a:bodyPr/>
+                    <a:lstStyle/>
+                    <a:p>
+                      <a:r>
+                        <a:rPr lang="en-US" sz="1200" dirty="0"/>
+                        <a:t>(2,3)</a:t>
+                      </a:r>
+                    </a:p>
+                  </a:txBody>
+                  <a:tcPr marL="61551" marR="61551" marT="30776" marB="30776">
+                    <a:solidFill>
+                      <a:schemeClr val="accent6">
+                        <a:lumMod val="40000"/>
+                        <a:lumOff val="60000"/>
+                      </a:schemeClr>
+                    </a:solidFill>
+                  </a:tcPr>
+                </a:tc>
+                <a:tc>
+                  <a:txBody>
+                    <a:bodyPr/>
+                    <a:lstStyle/>
+                    <a:p>
+                      <a:r>
+                        <a:rPr lang="en-US" sz="1200" dirty="0"/>
+                        <a:t>(2,4)</a:t>
+                      </a:r>
+                    </a:p>
+                  </a:txBody>
+                  <a:tcPr marL="61551" marR="61551" marT="30776" marB="30776">
+                    <a:solidFill>
+                      <a:schemeClr val="accent1">
+                        <a:lumMod val="40000"/>
+                        <a:lumOff val="60000"/>
+                      </a:schemeClr>
+                    </a:solidFill>
+                  </a:tcPr>
+                </a:tc>
+                <a:tc>
+                  <a:txBody>
+                    <a:bodyPr/>
+                    <a:lstStyle/>
+                    <a:p>
+                      <a:r>
+                        <a:rPr lang="en-US" sz="1200" dirty="0"/>
+                        <a:t>(2,5)</a:t>
+                      </a:r>
+                    </a:p>
+                  </a:txBody>
+                  <a:tcPr marL="61551" marR="61551" marT="30776" marB="30776">
+                    <a:solidFill>
+                      <a:schemeClr val="accent1">
+                        <a:lumMod val="40000"/>
+                        <a:lumOff val="60000"/>
+                      </a:schemeClr>
+                    </a:solidFill>
+                  </a:tcPr>
+                </a:tc>
+                <a:tc>
+                  <a:txBody>
+                    <a:bodyPr/>
+                    <a:lstStyle/>
+                    <a:p>
+                      <a:r>
+                        <a:rPr lang="en-US" sz="1200" dirty="0"/>
+                        <a:t>(2,6)</a:t>
+                      </a:r>
+                    </a:p>
+                  </a:txBody>
+                  <a:tcPr marL="61551" marR="61551" marT="30776" marB="30776">
+                    <a:solidFill>
+                      <a:schemeClr val="accent1">
+                        <a:lumMod val="40000"/>
+                        <a:lumOff val="60000"/>
+                      </a:schemeClr>
+                    </a:solidFill>
+                  </a:tcPr>
+                </a:tc>
+                <a:tc>
+                  <a:txBody>
+                    <a:bodyPr/>
+                    <a:lstStyle/>
+                    <a:p>
+                      <a:r>
+                        <a:rPr lang="en-US" sz="1200" dirty="0"/>
+                        <a:t>(2,7)</a:t>
+                      </a:r>
+                    </a:p>
+                  </a:txBody>
+                  <a:tcPr marL="61551" marR="61551" marT="30776" marB="30776">
+                    <a:solidFill>
+                      <a:schemeClr val="accent1">
+                        <a:lumMod val="40000"/>
+                        <a:lumOff val="60000"/>
+                      </a:schemeClr>
+                    </a:solidFill>
+                  </a:tcPr>
+                </a:tc>
+                <a:extLst>
+                  <a:ext uri="{0D108BD9-81ED-4DB2-BD59-A6C34878D82A}">
+                    <a16:rowId xmlns:a16="http://schemas.microsoft.com/office/drawing/2014/main" val="429311566"/>
+                  </a:ext>
+                </a:extLst>
+              </a:tr>
+              <a:tr h="246205">
+                <a:tc>
+                  <a:txBody>
+                    <a:bodyPr/>
+                    <a:lstStyle/>
+                    <a:p>
+                      <a:r>
+                        <a:rPr lang="en-US" sz="1200" dirty="0"/>
+                        <a:t>(3,0)</a:t>
+                      </a:r>
+                    </a:p>
+                  </a:txBody>
+                  <a:tcPr marL="61551" marR="61551" marT="30776" marB="30776">
+                    <a:solidFill>
+                      <a:schemeClr val="accent6">
+                        <a:lumMod val="40000"/>
+                        <a:lumOff val="60000"/>
+                      </a:schemeClr>
+                    </a:solidFill>
+                  </a:tcPr>
+                </a:tc>
+                <a:tc>
+                  <a:txBody>
+                    <a:bodyPr/>
+                    <a:lstStyle/>
+                    <a:p>
+                      <a:pPr marL="0" marR="0" lvl="0" indent="0" algn="l" defTabSz="914400" rtl="0" eaLnBrk="1" fontAlgn="auto" latinLnBrk="0" hangingPunct="1">
+                        <a:lnSpc>
+                          <a:spcPct val="100000"/>
+                        </a:lnSpc>
+                        <a:spcBef>
+                          <a:spcPts val="0"/>
+                        </a:spcBef>
+                        <a:spcAft>
+                          <a:spcPts val="0"/>
+                        </a:spcAft>
+                        <a:buClrTx/>
+                        <a:buSzTx/>
+                        <a:buFontTx/>
+                        <a:buNone/>
+                        <a:tabLst/>
+                        <a:defRPr/>
+                      </a:pPr>
+                      <a:r>
+                        <a:rPr lang="en-US" sz="1200" dirty="0"/>
+                        <a:t>(3,1)</a:t>
+                      </a:r>
+                    </a:p>
+                  </a:txBody>
+                  <a:tcPr marL="61551" marR="61551" marT="30776" marB="30776">
+                    <a:solidFill>
+                      <a:schemeClr val="accent6">
+                        <a:lumMod val="40000"/>
+                        <a:lumOff val="60000"/>
+                      </a:schemeClr>
+                    </a:solidFill>
+                  </a:tcPr>
+                </a:tc>
+                <a:tc>
+                  <a:txBody>
+                    <a:bodyPr/>
+                    <a:lstStyle/>
+                    <a:p>
+                      <a:r>
+                        <a:rPr lang="en-US" sz="1200" dirty="0"/>
+                        <a:t>(3,2)</a:t>
+                      </a:r>
+                    </a:p>
+                  </a:txBody>
+                  <a:tcPr marL="61551" marR="61551" marT="30776" marB="30776">
+                    <a:solidFill>
+                      <a:schemeClr val="accent6">
+                        <a:lumMod val="40000"/>
+                        <a:lumOff val="60000"/>
+                      </a:schemeClr>
+                    </a:solidFill>
+                  </a:tcPr>
+                </a:tc>
+                <a:tc>
+                  <a:txBody>
+                    <a:bodyPr/>
+                    <a:lstStyle/>
+                    <a:p>
+                      <a:r>
+                        <a:rPr lang="en-US" sz="1200" dirty="0"/>
+                        <a:t>(3,3)</a:t>
+                      </a:r>
+                    </a:p>
+                  </a:txBody>
+                  <a:tcPr marL="61551" marR="61551" marT="30776" marB="30776">
+                    <a:solidFill>
+                      <a:schemeClr val="accent6">
+                        <a:lumMod val="40000"/>
+                        <a:lumOff val="60000"/>
+                      </a:schemeClr>
+                    </a:solidFill>
+                  </a:tcPr>
+                </a:tc>
+                <a:tc>
+                  <a:txBody>
+                    <a:bodyPr/>
+                    <a:lstStyle/>
+                    <a:p>
+                      <a:r>
+                        <a:rPr lang="en-US" sz="1200" dirty="0"/>
+                        <a:t>(3,4)</a:t>
+                      </a:r>
+                    </a:p>
+                  </a:txBody>
+                  <a:tcPr marL="61551" marR="61551" marT="30776" marB="30776">
+                    <a:solidFill>
+                      <a:schemeClr val="accent1">
+                        <a:lumMod val="40000"/>
+                        <a:lumOff val="60000"/>
+                      </a:schemeClr>
+                    </a:solidFill>
+                  </a:tcPr>
+                </a:tc>
+                <a:tc>
+                  <a:txBody>
+                    <a:bodyPr/>
+                    <a:lstStyle/>
+                    <a:p>
+                      <a:r>
+                        <a:rPr lang="en-US" sz="1200" dirty="0"/>
+                        <a:t>(3,5)</a:t>
+                      </a:r>
+                    </a:p>
+                  </a:txBody>
+                  <a:tcPr marL="61551" marR="61551" marT="30776" marB="30776">
+                    <a:solidFill>
+                      <a:schemeClr val="accent1">
+                        <a:lumMod val="40000"/>
+                        <a:lumOff val="60000"/>
+                      </a:schemeClr>
+                    </a:solidFill>
+                  </a:tcPr>
+                </a:tc>
+                <a:tc>
+                  <a:txBody>
+                    <a:bodyPr/>
+                    <a:lstStyle/>
+                    <a:p>
+                      <a:r>
+                        <a:rPr lang="en-US" sz="1200" dirty="0"/>
+                        <a:t>(3,6)</a:t>
+                      </a:r>
+                    </a:p>
+                  </a:txBody>
+                  <a:tcPr marL="61551" marR="61551" marT="30776" marB="30776">
+                    <a:solidFill>
+                      <a:schemeClr val="accent1">
+                        <a:lumMod val="40000"/>
+                        <a:lumOff val="60000"/>
+                      </a:schemeClr>
+                    </a:solidFill>
+                  </a:tcPr>
+                </a:tc>
+                <a:tc>
+                  <a:txBody>
+                    <a:bodyPr/>
+                    <a:lstStyle/>
+                    <a:p>
+                      <a:r>
+                        <a:rPr lang="en-US" sz="1200" dirty="0"/>
+                        <a:t>(3,7)</a:t>
+                      </a:r>
+                    </a:p>
+                  </a:txBody>
+                  <a:tcPr marL="61551" marR="61551" marT="30776" marB="30776">
+                    <a:solidFill>
+                      <a:schemeClr val="accent1">
+                        <a:lumMod val="40000"/>
+                        <a:lumOff val="60000"/>
+                      </a:schemeClr>
+                    </a:solidFill>
+                  </a:tcPr>
+                </a:tc>
+                <a:extLst>
+                  <a:ext uri="{0D108BD9-81ED-4DB2-BD59-A6C34878D82A}">
+                    <a16:rowId xmlns:a16="http://schemas.microsoft.com/office/drawing/2014/main" val="1320477161"/>
+                  </a:ext>
+                </a:extLst>
+              </a:tr>
+              <a:tr h="246205">
+                <a:tc>
+                  <a:txBody>
+                    <a:bodyPr/>
+                    <a:lstStyle/>
+                    <a:p>
+                      <a:r>
+                        <a:rPr lang="en-US" sz="1200" dirty="0"/>
+                        <a:t>(4,0)</a:t>
+                      </a:r>
+                    </a:p>
+                  </a:txBody>
+                  <a:tcPr marL="61551" marR="61551" marT="30776" marB="30776">
+                    <a:solidFill>
+                      <a:schemeClr val="accent2">
+                        <a:lumMod val="40000"/>
+                        <a:lumOff val="60000"/>
+                      </a:schemeClr>
+                    </a:solidFill>
+                  </a:tcPr>
+                </a:tc>
+                <a:tc>
+                  <a:txBody>
+                    <a:bodyPr/>
+                    <a:lstStyle/>
+                    <a:p>
+                      <a:pPr marL="0" marR="0" lvl="0" indent="0" algn="l" defTabSz="914400" rtl="0" eaLnBrk="1" fontAlgn="auto" latinLnBrk="0" hangingPunct="1">
+                        <a:lnSpc>
+                          <a:spcPct val="100000"/>
+                        </a:lnSpc>
+                        <a:spcBef>
+                          <a:spcPts val="0"/>
+                        </a:spcBef>
+                        <a:spcAft>
+                          <a:spcPts val="0"/>
+                        </a:spcAft>
+                        <a:buClrTx/>
+                        <a:buSzTx/>
+                        <a:buFontTx/>
+                        <a:buNone/>
+                        <a:tabLst/>
+                        <a:defRPr/>
+                      </a:pPr>
+                      <a:r>
+                        <a:rPr lang="en-US" sz="1200" dirty="0"/>
+                        <a:t>(4,1)</a:t>
+                      </a:r>
+                    </a:p>
+                  </a:txBody>
+                  <a:tcPr marL="61551" marR="61551" marT="30776" marB="30776">
+                    <a:solidFill>
+                      <a:schemeClr val="accent2">
+                        <a:lumMod val="40000"/>
+                        <a:lumOff val="60000"/>
+                      </a:schemeClr>
+                    </a:solidFill>
+                  </a:tcPr>
+                </a:tc>
+                <a:tc>
+                  <a:txBody>
+                    <a:bodyPr/>
+                    <a:lstStyle/>
+                    <a:p>
+                      <a:r>
+                        <a:rPr lang="en-US" sz="1200" dirty="0"/>
+                        <a:t>(4,2)</a:t>
+                      </a:r>
+                    </a:p>
+                  </a:txBody>
+                  <a:tcPr marL="61551" marR="61551" marT="30776" marB="30776">
+                    <a:solidFill>
+                      <a:schemeClr val="accent2">
+                        <a:lumMod val="40000"/>
+                        <a:lumOff val="60000"/>
+                      </a:schemeClr>
+                    </a:solidFill>
+                  </a:tcPr>
+                </a:tc>
+                <a:tc>
+                  <a:txBody>
+                    <a:bodyPr/>
+                    <a:lstStyle/>
+                    <a:p>
+                      <a:r>
+                        <a:rPr lang="en-US" sz="1200" dirty="0"/>
+                        <a:t>(4,3)</a:t>
+                      </a:r>
+                    </a:p>
+                  </a:txBody>
+                  <a:tcPr marL="61551" marR="61551" marT="30776" marB="30776">
+                    <a:solidFill>
+                      <a:schemeClr val="accent2">
+                        <a:lumMod val="40000"/>
+                        <a:lumOff val="60000"/>
+                      </a:schemeClr>
+                    </a:solidFill>
+                  </a:tcPr>
+                </a:tc>
+                <a:tc>
+                  <a:txBody>
+                    <a:bodyPr/>
+                    <a:lstStyle/>
+                    <a:p>
+                      <a:r>
+                        <a:rPr lang="en-US" sz="1200" dirty="0"/>
+                        <a:t>(4,4)</a:t>
+                      </a:r>
+                    </a:p>
+                  </a:txBody>
+                  <a:tcPr marL="61551" marR="61551" marT="30776" marB="30776">
+                    <a:solidFill>
+                      <a:schemeClr val="accent6">
+                        <a:lumMod val="40000"/>
+                        <a:lumOff val="60000"/>
+                      </a:schemeClr>
+                    </a:solidFill>
+                  </a:tcPr>
+                </a:tc>
+                <a:tc>
+                  <a:txBody>
+                    <a:bodyPr/>
+                    <a:lstStyle/>
+                    <a:p>
+                      <a:r>
+                        <a:rPr lang="en-US" sz="1200" dirty="0"/>
+                        <a:t>(4,5)</a:t>
+                      </a:r>
+                    </a:p>
+                  </a:txBody>
+                  <a:tcPr marL="61551" marR="61551" marT="30776" marB="30776">
+                    <a:solidFill>
+                      <a:schemeClr val="accent6">
+                        <a:lumMod val="40000"/>
+                        <a:lumOff val="60000"/>
+                      </a:schemeClr>
+                    </a:solidFill>
+                  </a:tcPr>
+                </a:tc>
+                <a:tc>
+                  <a:txBody>
+                    <a:bodyPr/>
+                    <a:lstStyle/>
+                    <a:p>
+                      <a:r>
+                        <a:rPr lang="en-US" sz="1200" dirty="0"/>
+                        <a:t>(4,6)</a:t>
+                      </a:r>
+                    </a:p>
+                  </a:txBody>
+                  <a:tcPr marL="61551" marR="61551" marT="30776" marB="30776">
+                    <a:solidFill>
+                      <a:schemeClr val="accent6">
+                        <a:lumMod val="40000"/>
+                        <a:lumOff val="60000"/>
+                      </a:schemeClr>
+                    </a:solidFill>
+                  </a:tcPr>
+                </a:tc>
+                <a:tc>
+                  <a:txBody>
+                    <a:bodyPr/>
+                    <a:lstStyle/>
+                    <a:p>
+                      <a:r>
+                        <a:rPr lang="en-US" sz="1200" dirty="0"/>
+                        <a:t>(4,7)</a:t>
+                      </a:r>
+                    </a:p>
+                  </a:txBody>
+                  <a:tcPr marL="61551" marR="61551" marT="30776" marB="30776">
+                    <a:solidFill>
+                      <a:schemeClr val="accent6">
+                        <a:lumMod val="40000"/>
+                        <a:lumOff val="60000"/>
+                      </a:schemeClr>
+                    </a:solidFill>
+                  </a:tcPr>
+                </a:tc>
+                <a:extLst>
+                  <a:ext uri="{0D108BD9-81ED-4DB2-BD59-A6C34878D82A}">
+                    <a16:rowId xmlns:a16="http://schemas.microsoft.com/office/drawing/2014/main" val="1199484508"/>
+                  </a:ext>
+                </a:extLst>
+              </a:tr>
+              <a:tr h="246205">
+                <a:tc>
+                  <a:txBody>
+                    <a:bodyPr/>
+                    <a:lstStyle/>
+                    <a:p>
+                      <a:r>
+                        <a:rPr lang="en-US" sz="1200" dirty="0"/>
+                        <a:t>(5,0)</a:t>
+                      </a:r>
+                    </a:p>
+                  </a:txBody>
+                  <a:tcPr marL="61551" marR="61551" marT="30776" marB="30776">
+                    <a:solidFill>
+                      <a:schemeClr val="accent2">
+                        <a:lumMod val="40000"/>
+                        <a:lumOff val="60000"/>
+                      </a:schemeClr>
+                    </a:solidFill>
+                  </a:tcPr>
+                </a:tc>
+                <a:tc>
+                  <a:txBody>
+                    <a:bodyPr/>
+                    <a:lstStyle/>
+                    <a:p>
+                      <a:pPr marL="0" marR="0" lvl="0" indent="0" algn="l" defTabSz="914400" rtl="0" eaLnBrk="1" fontAlgn="auto" latinLnBrk="0" hangingPunct="1">
+                        <a:lnSpc>
+                          <a:spcPct val="100000"/>
+                        </a:lnSpc>
+                        <a:spcBef>
+                          <a:spcPts val="0"/>
+                        </a:spcBef>
+                        <a:spcAft>
+                          <a:spcPts val="0"/>
+                        </a:spcAft>
+                        <a:buClrTx/>
+                        <a:buSzTx/>
+                        <a:buFontTx/>
+                        <a:buNone/>
+                        <a:tabLst/>
+                        <a:defRPr/>
+                      </a:pPr>
+                      <a:r>
+                        <a:rPr lang="en-US" sz="1200" dirty="0"/>
+                        <a:t>(5,1)</a:t>
+                      </a:r>
+                    </a:p>
+                  </a:txBody>
+                  <a:tcPr marL="61551" marR="61551" marT="30776" marB="30776">
+                    <a:solidFill>
+                      <a:schemeClr val="accent2">
+                        <a:lumMod val="40000"/>
+                        <a:lumOff val="60000"/>
+                      </a:schemeClr>
+                    </a:solidFill>
+                  </a:tcPr>
+                </a:tc>
+                <a:tc>
+                  <a:txBody>
+                    <a:bodyPr/>
+                    <a:lstStyle/>
+                    <a:p>
+                      <a:r>
+                        <a:rPr lang="en-US" sz="1200" dirty="0"/>
+                        <a:t>(5,2)</a:t>
+                      </a:r>
+                    </a:p>
+                  </a:txBody>
+                  <a:tcPr marL="61551" marR="61551" marT="30776" marB="30776">
+                    <a:solidFill>
+                      <a:schemeClr val="accent2">
+                        <a:lumMod val="40000"/>
+                        <a:lumOff val="60000"/>
+                      </a:schemeClr>
+                    </a:solidFill>
+                  </a:tcPr>
+                </a:tc>
+                <a:tc>
+                  <a:txBody>
+                    <a:bodyPr/>
+                    <a:lstStyle/>
+                    <a:p>
+                      <a:r>
+                        <a:rPr lang="en-US" sz="1200" dirty="0"/>
+                        <a:t>(5,3)</a:t>
+                      </a:r>
+                    </a:p>
+                  </a:txBody>
+                  <a:tcPr marL="61551" marR="61551" marT="30776" marB="30776">
+                    <a:solidFill>
+                      <a:schemeClr val="accent2">
+                        <a:lumMod val="40000"/>
+                        <a:lumOff val="60000"/>
+                      </a:schemeClr>
+                    </a:solidFill>
+                  </a:tcPr>
+                </a:tc>
+                <a:tc>
+                  <a:txBody>
+                    <a:bodyPr/>
+                    <a:lstStyle/>
+                    <a:p>
+                      <a:r>
+                        <a:rPr lang="en-US" sz="1200" dirty="0"/>
+                        <a:t>(5,4)</a:t>
+                      </a:r>
+                    </a:p>
+                  </a:txBody>
+                  <a:tcPr marL="61551" marR="61551" marT="30776" marB="30776">
+                    <a:solidFill>
+                      <a:schemeClr val="accent6">
+                        <a:lumMod val="40000"/>
+                        <a:lumOff val="60000"/>
+                      </a:schemeClr>
+                    </a:solidFill>
+                  </a:tcPr>
+                </a:tc>
+                <a:tc>
+                  <a:txBody>
+                    <a:bodyPr/>
+                    <a:lstStyle/>
+                    <a:p>
+                      <a:r>
+                        <a:rPr lang="en-US" sz="1200" dirty="0"/>
+                        <a:t>(5,5)</a:t>
+                      </a:r>
+                    </a:p>
+                  </a:txBody>
+                  <a:tcPr marL="61551" marR="61551" marT="30776" marB="30776">
+                    <a:solidFill>
+                      <a:schemeClr val="accent6">
+                        <a:lumMod val="40000"/>
+                        <a:lumOff val="60000"/>
+                      </a:schemeClr>
+                    </a:solidFill>
+                  </a:tcPr>
+                </a:tc>
+                <a:tc>
+                  <a:txBody>
+                    <a:bodyPr/>
+                    <a:lstStyle/>
+                    <a:p>
+                      <a:r>
+                        <a:rPr lang="en-US" sz="1200" dirty="0"/>
+                        <a:t>(5,6)</a:t>
+                      </a:r>
+                    </a:p>
+                  </a:txBody>
+                  <a:tcPr marL="61551" marR="61551" marT="30776" marB="30776">
+                    <a:solidFill>
+                      <a:schemeClr val="accent6">
+                        <a:lumMod val="40000"/>
+                        <a:lumOff val="60000"/>
+                      </a:schemeClr>
+                    </a:solidFill>
+                  </a:tcPr>
+                </a:tc>
+                <a:tc>
+                  <a:txBody>
+                    <a:bodyPr/>
+                    <a:lstStyle/>
+                    <a:p>
+                      <a:r>
+                        <a:rPr lang="en-US" sz="1200" dirty="0"/>
+                        <a:t>(5,7)</a:t>
+                      </a:r>
+                    </a:p>
+                  </a:txBody>
+                  <a:tcPr marL="61551" marR="61551" marT="30776" marB="30776">
+                    <a:solidFill>
+                      <a:schemeClr val="accent6">
+                        <a:lumMod val="40000"/>
+                        <a:lumOff val="60000"/>
+                      </a:schemeClr>
+                    </a:solidFill>
+                  </a:tcPr>
+                </a:tc>
+                <a:extLst>
+                  <a:ext uri="{0D108BD9-81ED-4DB2-BD59-A6C34878D82A}">
+                    <a16:rowId xmlns:a16="http://schemas.microsoft.com/office/drawing/2014/main" val="4115094472"/>
+                  </a:ext>
+                </a:extLst>
+              </a:tr>
+            </a:tbl>
+          </a:graphicData>
+        </a:graphic>
+      </p:graphicFrame>
+      <p:sp>
+        <p:nvSpPr>
+          <p:cNvPr id="13" name="文本框 12">
+            <a:extLst>
+              <a:ext uri="{FF2B5EF4-FFF2-40B4-BE49-F238E27FC236}">
+                <a16:creationId xmlns:a16="http://schemas.microsoft.com/office/drawing/2014/main" id="{CEBF7A39-A17D-C47E-4036-2C51CBF8BE58}"/>
+              </a:ext>
+            </a:extLst>
+          </p:cNvPr>
+          <p:cNvSpPr txBox="1"/>
+          <p:nvPr/>
+        </p:nvSpPr>
+        <p:spPr>
+          <a:xfrm>
+            <a:off x="21880" y="1901680"/>
+            <a:ext cx="402674" cy="461665"/>
+          </a:xfrm>
+          <a:prstGeom prst="rect">
+            <a:avLst/>
+          </a:prstGeom>
+          <a:noFill/>
+        </p:spPr>
+        <p:txBody>
+          <a:bodyPr wrap="none" rtlCol="0">
+            <a:spAutoFit/>
+          </a:bodyPr>
+          <a:lstStyle/>
+          <a:p>
+            <a:r>
+              <a:rPr lang="en-US" sz="2400" dirty="0"/>
+              <a:t>N</a:t>
+            </a:r>
+          </a:p>
+        </p:txBody>
+      </p:sp>
+      <p:sp>
+        <p:nvSpPr>
+          <p:cNvPr id="14" name="文本框 13">
+            <a:extLst>
+              <a:ext uri="{FF2B5EF4-FFF2-40B4-BE49-F238E27FC236}">
+                <a16:creationId xmlns:a16="http://schemas.microsoft.com/office/drawing/2014/main" id="{AE7D692C-9FBB-C9F0-88ED-7133C2036294}"/>
+              </a:ext>
+            </a:extLst>
+          </p:cNvPr>
+          <p:cNvSpPr txBox="1"/>
+          <p:nvPr/>
+        </p:nvSpPr>
+        <p:spPr>
+          <a:xfrm>
+            <a:off x="2395533" y="684487"/>
+            <a:ext cx="359394" cy="461665"/>
+          </a:xfrm>
+          <a:prstGeom prst="rect">
+            <a:avLst/>
+          </a:prstGeom>
+          <a:noFill/>
+        </p:spPr>
+        <p:txBody>
+          <a:bodyPr wrap="none" rtlCol="0">
+            <a:spAutoFit/>
+          </a:bodyPr>
+          <a:lstStyle/>
+          <a:p>
+            <a:r>
+              <a:rPr lang="en-US" sz="2400" dirty="0"/>
+              <a:t>K</a:t>
+            </a:r>
+          </a:p>
+        </p:txBody>
+      </p:sp>
+      <p:sp>
+        <p:nvSpPr>
+          <p:cNvPr id="15" name="右大括号 14">
+            <a:extLst>
+              <a:ext uri="{FF2B5EF4-FFF2-40B4-BE49-F238E27FC236}">
+                <a16:creationId xmlns:a16="http://schemas.microsoft.com/office/drawing/2014/main" id="{0CFE238D-2617-0C8D-7CE2-F75E65C472B5}"/>
+              </a:ext>
+            </a:extLst>
+          </p:cNvPr>
+          <p:cNvSpPr/>
+          <p:nvPr/>
+        </p:nvSpPr>
+        <p:spPr>
+          <a:xfrm rot="16200000">
+            <a:off x="2492791" y="-716581"/>
+            <a:ext cx="164882" cy="3877249"/>
+          </a:xfrm>
+          <a:prstGeom prst="rightBrace">
+            <a:avLst>
+              <a:gd name="adj1" fmla="val 88333"/>
+              <a:gd name="adj2" fmla="val 50000"/>
+            </a:avLst>
+          </a:prstGeom>
+          <a:ln w="28575"/>
+        </p:spPr>
+        <p:style>
+          <a:lnRef idx="2">
+            <a:schemeClr val="dk1"/>
+          </a:lnRef>
+          <a:fillRef idx="0">
+            <a:schemeClr val="dk1"/>
+          </a:fillRef>
+          <a:effectRef idx="1">
+            <a:schemeClr val="dk1"/>
+          </a:effectRef>
+          <a:fontRef idx="minor">
+            <a:schemeClr val="tx1"/>
+          </a:fontRef>
+        </p:style>
+        <p:txBody>
+          <a:bodyPr rtlCol="0" anchor="ctr"/>
+          <a:lstStyle/>
+          <a:p>
+            <a:pPr algn="ctr"/>
+            <a:endParaRPr lang="en-US"/>
+          </a:p>
+        </p:txBody>
+      </p:sp>
+      <p:sp>
+        <p:nvSpPr>
+          <p:cNvPr id="16" name="右大括号 15">
+            <a:extLst>
+              <a:ext uri="{FF2B5EF4-FFF2-40B4-BE49-F238E27FC236}">
+                <a16:creationId xmlns:a16="http://schemas.microsoft.com/office/drawing/2014/main" id="{DDABF846-48D7-4903-76A7-B755D79C78A6}"/>
+              </a:ext>
+            </a:extLst>
+          </p:cNvPr>
+          <p:cNvSpPr/>
+          <p:nvPr/>
+        </p:nvSpPr>
+        <p:spPr>
+          <a:xfrm rot="10800000">
+            <a:off x="410094" y="1393899"/>
+            <a:ext cx="164882" cy="1477229"/>
+          </a:xfrm>
+          <a:prstGeom prst="rightBrace">
+            <a:avLst>
+              <a:gd name="adj1" fmla="val 88333"/>
+              <a:gd name="adj2" fmla="val 50000"/>
+            </a:avLst>
+          </a:prstGeom>
+          <a:ln w="28575"/>
+        </p:spPr>
+        <p:style>
+          <a:lnRef idx="2">
+            <a:schemeClr val="dk1"/>
+          </a:lnRef>
+          <a:fillRef idx="0">
+            <a:schemeClr val="dk1"/>
+          </a:fillRef>
+          <a:effectRef idx="1">
+            <a:schemeClr val="dk1"/>
+          </a:effectRef>
+          <a:fontRef idx="minor">
+            <a:schemeClr val="tx1"/>
+          </a:fontRef>
+        </p:style>
+        <p:txBody>
+          <a:bodyPr rtlCol="0" anchor="ctr"/>
+          <a:lstStyle/>
+          <a:p>
+            <a:pPr algn="ctr"/>
+            <a:endParaRPr lang="en-US"/>
+          </a:p>
+        </p:txBody>
+      </p:sp>
+      <p:graphicFrame>
+        <p:nvGraphicFramePr>
+          <p:cNvPr id="17" name="表格 16">
+            <a:extLst>
+              <a:ext uri="{FF2B5EF4-FFF2-40B4-BE49-F238E27FC236}">
+                <a16:creationId xmlns:a16="http://schemas.microsoft.com/office/drawing/2014/main" id="{8290BB16-3563-0CB0-AD6C-EE3FD0885A35}"/>
+              </a:ext>
+            </a:extLst>
+          </p:cNvPr>
+          <p:cNvGraphicFramePr>
+            <a:graphicFrameLocks noGrp="1"/>
+          </p:cNvGraphicFramePr>
+          <p:nvPr>
+            <p:extLst>
+              <p:ext uri="{D42A27DB-BD31-4B8C-83A1-F6EECF244321}">
+                <p14:modId xmlns:p14="http://schemas.microsoft.com/office/powerpoint/2010/main" val="137862610"/>
+              </p:ext>
+            </p:extLst>
+          </p:nvPr>
+        </p:nvGraphicFramePr>
+        <p:xfrm>
+          <a:off x="5739144" y="1874481"/>
+          <a:ext cx="1680440" cy="488864"/>
+        </p:xfrm>
+        <a:graphic>
+          <a:graphicData uri="http://schemas.openxmlformats.org/drawingml/2006/table">
+            <a:tbl>
+              <a:tblPr firstRow="1" bandRow="1">
+                <a:tableStyleId>{5940675A-B579-460E-94D1-54222C63F5DA}</a:tableStyleId>
+              </a:tblPr>
+              <a:tblGrid>
+                <a:gridCol w="420110">
+                  <a:extLst>
+                    <a:ext uri="{9D8B030D-6E8A-4147-A177-3AD203B41FA5}">
+                      <a16:colId xmlns:a16="http://schemas.microsoft.com/office/drawing/2014/main" val="2034969248"/>
+                    </a:ext>
+                  </a:extLst>
+                </a:gridCol>
+                <a:gridCol w="420110">
+                  <a:extLst>
+                    <a:ext uri="{9D8B030D-6E8A-4147-A177-3AD203B41FA5}">
+                      <a16:colId xmlns:a16="http://schemas.microsoft.com/office/drawing/2014/main" val="4259093849"/>
+                    </a:ext>
+                  </a:extLst>
+                </a:gridCol>
+                <a:gridCol w="420110">
+                  <a:extLst>
+                    <a:ext uri="{9D8B030D-6E8A-4147-A177-3AD203B41FA5}">
+                      <a16:colId xmlns:a16="http://schemas.microsoft.com/office/drawing/2014/main" val="1669695598"/>
+                    </a:ext>
+                  </a:extLst>
+                </a:gridCol>
+                <a:gridCol w="420110">
+                  <a:extLst>
+                    <a:ext uri="{9D8B030D-6E8A-4147-A177-3AD203B41FA5}">
+                      <a16:colId xmlns:a16="http://schemas.microsoft.com/office/drawing/2014/main" val="3881258515"/>
+                    </a:ext>
+                  </a:extLst>
+                </a:gridCol>
+              </a:tblGrid>
+              <a:tr h="236614">
+                <a:tc>
+                  <a:txBody>
+                    <a:bodyPr/>
+                    <a:lstStyle/>
+                    <a:p>
+                      <a:r>
+                        <a:rPr lang="en-US" sz="1200" dirty="0"/>
+                        <a:t>(2,4)</a:t>
+                      </a:r>
+                    </a:p>
+                  </a:txBody>
+                  <a:tcPr marL="61551" marR="61551" marT="30776" marB="30776">
+                    <a:solidFill>
+                      <a:schemeClr val="accent1">
+                        <a:lumMod val="40000"/>
+                        <a:lumOff val="60000"/>
+                      </a:schemeClr>
+                    </a:solidFill>
+                  </a:tcPr>
+                </a:tc>
+                <a:tc>
+                  <a:txBody>
+                    <a:bodyPr/>
+                    <a:lstStyle/>
+                    <a:p>
+                      <a:r>
+                        <a:rPr lang="en-US" sz="1200" dirty="0"/>
+                        <a:t>(2,5)</a:t>
+                      </a:r>
+                    </a:p>
+                  </a:txBody>
+                  <a:tcPr marL="61551" marR="61551" marT="30776" marB="30776">
+                    <a:solidFill>
+                      <a:schemeClr val="accent1">
+                        <a:lumMod val="40000"/>
+                        <a:lumOff val="60000"/>
+                      </a:schemeClr>
+                    </a:solidFill>
+                  </a:tcPr>
+                </a:tc>
+                <a:tc>
+                  <a:txBody>
+                    <a:bodyPr/>
+                    <a:lstStyle/>
+                    <a:p>
+                      <a:r>
+                        <a:rPr lang="en-US" sz="1200" dirty="0"/>
+                        <a:t>(2,6)</a:t>
+                      </a:r>
+                    </a:p>
+                  </a:txBody>
+                  <a:tcPr marL="61551" marR="61551" marT="30776" marB="30776">
+                    <a:solidFill>
+                      <a:schemeClr val="accent1">
+                        <a:lumMod val="40000"/>
+                        <a:lumOff val="60000"/>
+                      </a:schemeClr>
+                    </a:solidFill>
+                  </a:tcPr>
+                </a:tc>
+                <a:tc>
+                  <a:txBody>
+                    <a:bodyPr/>
+                    <a:lstStyle/>
+                    <a:p>
+                      <a:r>
+                        <a:rPr lang="en-US" sz="1200" dirty="0"/>
+                        <a:t>(2,7)</a:t>
+                      </a:r>
+                    </a:p>
+                  </a:txBody>
+                  <a:tcPr marL="61551" marR="61551" marT="30776" marB="30776">
+                    <a:solidFill>
+                      <a:schemeClr val="accent1">
+                        <a:lumMod val="40000"/>
+                        <a:lumOff val="60000"/>
+                      </a:schemeClr>
+                    </a:solidFill>
+                  </a:tcPr>
+                </a:tc>
+                <a:extLst>
+                  <a:ext uri="{0D108BD9-81ED-4DB2-BD59-A6C34878D82A}">
+                    <a16:rowId xmlns:a16="http://schemas.microsoft.com/office/drawing/2014/main" val="1340743427"/>
+                  </a:ext>
+                </a:extLst>
+              </a:tr>
+              <a:tr h="236614">
+                <a:tc>
+                  <a:txBody>
+                    <a:bodyPr/>
+                    <a:lstStyle/>
+                    <a:p>
+                      <a:r>
+                        <a:rPr lang="en-US" sz="1200" dirty="0"/>
+                        <a:t>(3,4)</a:t>
+                      </a:r>
+                    </a:p>
+                  </a:txBody>
+                  <a:tcPr marL="61551" marR="61551" marT="30776" marB="30776">
+                    <a:solidFill>
+                      <a:schemeClr val="accent1">
+                        <a:lumMod val="40000"/>
+                        <a:lumOff val="60000"/>
+                      </a:schemeClr>
+                    </a:solidFill>
+                  </a:tcPr>
+                </a:tc>
+                <a:tc>
+                  <a:txBody>
+                    <a:bodyPr/>
+                    <a:lstStyle/>
+                    <a:p>
+                      <a:r>
+                        <a:rPr lang="en-US" sz="1200" dirty="0"/>
+                        <a:t>(3,5)</a:t>
+                      </a:r>
+                    </a:p>
+                  </a:txBody>
+                  <a:tcPr marL="61551" marR="61551" marT="30776" marB="30776">
+                    <a:solidFill>
+                      <a:schemeClr val="accent1">
+                        <a:lumMod val="40000"/>
+                        <a:lumOff val="60000"/>
+                      </a:schemeClr>
+                    </a:solidFill>
+                  </a:tcPr>
+                </a:tc>
+                <a:tc>
+                  <a:txBody>
+                    <a:bodyPr/>
+                    <a:lstStyle/>
+                    <a:p>
+                      <a:r>
+                        <a:rPr lang="en-US" sz="1200" dirty="0"/>
+                        <a:t>(3,6)</a:t>
+                      </a:r>
+                    </a:p>
+                  </a:txBody>
+                  <a:tcPr marL="61551" marR="61551" marT="30776" marB="30776">
+                    <a:solidFill>
+                      <a:schemeClr val="accent1">
+                        <a:lumMod val="40000"/>
+                        <a:lumOff val="60000"/>
+                      </a:schemeClr>
+                    </a:solidFill>
+                  </a:tcPr>
+                </a:tc>
+                <a:tc>
+                  <a:txBody>
+                    <a:bodyPr/>
+                    <a:lstStyle/>
+                    <a:p>
+                      <a:r>
+                        <a:rPr lang="en-US" sz="1200" dirty="0"/>
+                        <a:t>(3,7)</a:t>
+                      </a:r>
+                    </a:p>
+                  </a:txBody>
+                  <a:tcPr marL="61551" marR="61551" marT="30776" marB="30776">
+                    <a:solidFill>
+                      <a:schemeClr val="accent1">
+                        <a:lumMod val="40000"/>
+                        <a:lumOff val="60000"/>
+                      </a:schemeClr>
+                    </a:solidFill>
+                  </a:tcPr>
+                </a:tc>
+                <a:extLst>
+                  <a:ext uri="{0D108BD9-81ED-4DB2-BD59-A6C34878D82A}">
+                    <a16:rowId xmlns:a16="http://schemas.microsoft.com/office/drawing/2014/main" val="4081798692"/>
+                  </a:ext>
+                </a:extLst>
+              </a:tr>
+            </a:tbl>
+          </a:graphicData>
+        </a:graphic>
+      </p:graphicFrame>
+      <p:sp>
+        <p:nvSpPr>
+          <p:cNvPr id="18" name="文本框 17">
+            <a:extLst>
+              <a:ext uri="{FF2B5EF4-FFF2-40B4-BE49-F238E27FC236}">
+                <a16:creationId xmlns:a16="http://schemas.microsoft.com/office/drawing/2014/main" id="{B2B04F6E-2D06-B4F8-977E-A63C0357F0A7}"/>
+              </a:ext>
+            </a:extLst>
+          </p:cNvPr>
+          <p:cNvSpPr txBox="1"/>
+          <p:nvPr/>
+        </p:nvSpPr>
+        <p:spPr>
+          <a:xfrm>
+            <a:off x="1111175" y="3201934"/>
+            <a:ext cx="2928109" cy="461665"/>
+          </a:xfrm>
+          <a:prstGeom prst="rect">
+            <a:avLst/>
+          </a:prstGeom>
+          <a:noFill/>
+        </p:spPr>
+        <p:txBody>
+          <a:bodyPr wrap="none" rtlCol="0">
+            <a:spAutoFit/>
+          </a:bodyPr>
+          <a:lstStyle/>
+          <a:p>
+            <a:r>
+              <a:rPr lang="en-US" sz="2400" dirty="0"/>
+              <a:t>gmem_tensor_coord</a:t>
+            </a:r>
+          </a:p>
+        </p:txBody>
+      </p:sp>
+      <p:sp>
+        <p:nvSpPr>
+          <p:cNvPr id="19" name="文本框 18">
+            <a:extLst>
+              <a:ext uri="{FF2B5EF4-FFF2-40B4-BE49-F238E27FC236}">
+                <a16:creationId xmlns:a16="http://schemas.microsoft.com/office/drawing/2014/main" id="{DEE2009C-3661-9507-7EC5-5DD71BEC054C}"/>
+              </a:ext>
+            </a:extLst>
+          </p:cNvPr>
+          <p:cNvSpPr txBox="1"/>
+          <p:nvPr/>
+        </p:nvSpPr>
+        <p:spPr>
+          <a:xfrm>
+            <a:off x="4682145" y="3198167"/>
+            <a:ext cx="3492751" cy="461665"/>
+          </a:xfrm>
+          <a:prstGeom prst="rect">
+            <a:avLst/>
+          </a:prstGeom>
+          <a:noFill/>
+        </p:spPr>
+        <p:txBody>
+          <a:bodyPr wrap="none" rtlCol="0">
+            <a:spAutoFit/>
+          </a:bodyPr>
+          <a:lstStyle/>
+          <a:p>
+            <a:r>
+              <a:rPr lang="en-US" sz="2400" dirty="0"/>
+              <a:t>gmem_tensor_coord_cta</a:t>
+            </a:r>
+          </a:p>
+        </p:txBody>
+      </p:sp>
+      <p:sp>
+        <p:nvSpPr>
+          <p:cNvPr id="29" name="右大括号 28">
+            <a:extLst>
+              <a:ext uri="{FF2B5EF4-FFF2-40B4-BE49-F238E27FC236}">
+                <a16:creationId xmlns:a16="http://schemas.microsoft.com/office/drawing/2014/main" id="{DE2910B7-390D-9C89-2A9E-530BA1249B26}"/>
+              </a:ext>
+            </a:extLst>
+          </p:cNvPr>
+          <p:cNvSpPr/>
+          <p:nvPr/>
+        </p:nvSpPr>
+        <p:spPr>
+          <a:xfrm rot="10800000">
+            <a:off x="5513751" y="1874480"/>
+            <a:ext cx="164882" cy="488865"/>
+          </a:xfrm>
+          <a:prstGeom prst="rightBrace">
+            <a:avLst>
+              <a:gd name="adj1" fmla="val 88333"/>
+              <a:gd name="adj2" fmla="val 50000"/>
+            </a:avLst>
+          </a:prstGeom>
+          <a:ln w="28575"/>
+        </p:spPr>
+        <p:style>
+          <a:lnRef idx="2">
+            <a:schemeClr val="dk1"/>
+          </a:lnRef>
+          <a:fillRef idx="0">
+            <a:schemeClr val="dk1"/>
+          </a:fillRef>
+          <a:effectRef idx="1">
+            <a:schemeClr val="dk1"/>
+          </a:effectRef>
+          <a:fontRef idx="minor">
+            <a:schemeClr val="tx1"/>
+          </a:fontRef>
+        </p:style>
+        <p:txBody>
+          <a:bodyPr rtlCol="0" anchor="ctr"/>
+          <a:lstStyle/>
+          <a:p>
+            <a:pPr algn="ctr"/>
+            <a:endParaRPr lang="en-US"/>
+          </a:p>
+        </p:txBody>
+      </p:sp>
+      <p:sp>
+        <p:nvSpPr>
+          <p:cNvPr id="30" name="文本框 29">
+            <a:extLst>
+              <a:ext uri="{FF2B5EF4-FFF2-40B4-BE49-F238E27FC236}">
+                <a16:creationId xmlns:a16="http://schemas.microsoft.com/office/drawing/2014/main" id="{DD2025A6-3306-81A6-C13B-196C1952D0B8}"/>
+              </a:ext>
+            </a:extLst>
+          </p:cNvPr>
+          <p:cNvSpPr txBox="1"/>
+          <p:nvPr/>
+        </p:nvSpPr>
+        <p:spPr>
+          <a:xfrm>
+            <a:off x="4503283" y="1925464"/>
+            <a:ext cx="1065613" cy="461665"/>
+          </a:xfrm>
+          <a:prstGeom prst="rect">
+            <a:avLst/>
+          </a:prstGeom>
+          <a:noFill/>
+        </p:spPr>
+        <p:txBody>
+          <a:bodyPr wrap="none" rtlCol="0">
+            <a:spAutoFit/>
+          </a:bodyPr>
+          <a:lstStyle/>
+          <a:p>
+            <a:r>
+              <a:rPr lang="en-US" sz="2400" dirty="0"/>
+              <a:t>CTA_N</a:t>
+            </a:r>
+          </a:p>
+        </p:txBody>
+      </p:sp>
+      <p:sp>
+        <p:nvSpPr>
+          <p:cNvPr id="32" name="文本框 31">
+            <a:extLst>
+              <a:ext uri="{FF2B5EF4-FFF2-40B4-BE49-F238E27FC236}">
+                <a16:creationId xmlns:a16="http://schemas.microsoft.com/office/drawing/2014/main" id="{62F1AB64-BACF-856A-FC9E-F56E363F01D8}"/>
+              </a:ext>
+            </a:extLst>
+          </p:cNvPr>
+          <p:cNvSpPr txBox="1"/>
+          <p:nvPr/>
+        </p:nvSpPr>
+        <p:spPr>
+          <a:xfrm>
+            <a:off x="6068198" y="1209650"/>
+            <a:ext cx="1022331" cy="461665"/>
+          </a:xfrm>
+          <a:prstGeom prst="rect">
+            <a:avLst/>
+          </a:prstGeom>
+          <a:noFill/>
+        </p:spPr>
+        <p:txBody>
+          <a:bodyPr wrap="none" rtlCol="0">
+            <a:spAutoFit/>
+          </a:bodyPr>
+          <a:lstStyle/>
+          <a:p>
+            <a:r>
+              <a:rPr lang="en-US" sz="2400" dirty="0"/>
+              <a:t>CTA_K</a:t>
+            </a:r>
+          </a:p>
+        </p:txBody>
+      </p:sp>
+      <p:sp>
+        <p:nvSpPr>
+          <p:cNvPr id="33" name="右大括号 32">
+            <a:extLst>
+              <a:ext uri="{FF2B5EF4-FFF2-40B4-BE49-F238E27FC236}">
+                <a16:creationId xmlns:a16="http://schemas.microsoft.com/office/drawing/2014/main" id="{044EE25B-5261-8C07-6425-7592D8C4860D}"/>
+              </a:ext>
+            </a:extLst>
+          </p:cNvPr>
+          <p:cNvSpPr/>
+          <p:nvPr/>
+        </p:nvSpPr>
+        <p:spPr>
+          <a:xfrm rot="16200000">
+            <a:off x="6500804" y="891499"/>
+            <a:ext cx="164882" cy="1672682"/>
+          </a:xfrm>
+          <a:prstGeom prst="rightBrace">
+            <a:avLst>
+              <a:gd name="adj1" fmla="val 88333"/>
+              <a:gd name="adj2" fmla="val 50000"/>
+            </a:avLst>
+          </a:prstGeom>
+          <a:ln w="28575"/>
+        </p:spPr>
+        <p:style>
+          <a:lnRef idx="2">
+            <a:schemeClr val="dk1"/>
+          </a:lnRef>
+          <a:fillRef idx="0">
+            <a:schemeClr val="dk1"/>
+          </a:fillRef>
+          <a:effectRef idx="1">
+            <a:schemeClr val="dk1"/>
+          </a:effectRef>
+          <a:fontRef idx="minor">
+            <a:schemeClr val="tx1"/>
+          </a:fontRef>
+        </p:style>
+        <p:txBody>
+          <a:bodyPr rtlCol="0" anchor="ctr"/>
+          <a:lstStyle/>
+          <a:p>
+            <a:pPr algn="ctr"/>
+            <a:endParaRPr lang="en-US"/>
+          </a:p>
+        </p:txBody>
+      </p:sp>
+      <p:graphicFrame>
+        <p:nvGraphicFramePr>
+          <p:cNvPr id="34" name="表格 33">
+            <a:extLst>
+              <a:ext uri="{FF2B5EF4-FFF2-40B4-BE49-F238E27FC236}">
+                <a16:creationId xmlns:a16="http://schemas.microsoft.com/office/drawing/2014/main" id="{DCAE77A7-1010-A6F5-A228-792F9C49E342}"/>
+              </a:ext>
+            </a:extLst>
+          </p:cNvPr>
+          <p:cNvGraphicFramePr>
+            <a:graphicFrameLocks noGrp="1"/>
+          </p:cNvGraphicFramePr>
+          <p:nvPr>
+            <p:extLst>
+              <p:ext uri="{D42A27DB-BD31-4B8C-83A1-F6EECF244321}">
+                <p14:modId xmlns:p14="http://schemas.microsoft.com/office/powerpoint/2010/main" val="2921662858"/>
+              </p:ext>
+            </p:extLst>
+          </p:nvPr>
+        </p:nvGraphicFramePr>
+        <p:xfrm>
+          <a:off x="9363670" y="1732789"/>
+          <a:ext cx="1007836" cy="822960"/>
+        </p:xfrm>
+        <a:graphic>
+          <a:graphicData uri="http://schemas.openxmlformats.org/drawingml/2006/table">
+            <a:tbl>
+              <a:tblPr firstRow="1" bandRow="1">
+                <a:tableStyleId>{5940675A-B579-460E-94D1-54222C63F5DA}</a:tableStyleId>
+              </a:tblPr>
+              <a:tblGrid>
+                <a:gridCol w="503918">
+                  <a:extLst>
+                    <a:ext uri="{9D8B030D-6E8A-4147-A177-3AD203B41FA5}">
+                      <a16:colId xmlns:a16="http://schemas.microsoft.com/office/drawing/2014/main" val="2034969248"/>
+                    </a:ext>
+                  </a:extLst>
+                </a:gridCol>
+                <a:gridCol w="503918">
+                  <a:extLst>
+                    <a:ext uri="{9D8B030D-6E8A-4147-A177-3AD203B41FA5}">
+                      <a16:colId xmlns:a16="http://schemas.microsoft.com/office/drawing/2014/main" val="4259093849"/>
+                    </a:ext>
+                  </a:extLst>
+                </a:gridCol>
+              </a:tblGrid>
+              <a:tr h="235846">
+                <a:tc>
+                  <a:txBody>
+                    <a:bodyPr/>
+                    <a:lstStyle/>
+                    <a:p>
+                      <a:r>
+                        <a:rPr lang="en-US" sz="1200" dirty="0"/>
+                        <a:t>(0,0)</a:t>
+                      </a:r>
+                    </a:p>
+                  </a:txBody>
+                  <a:tcPr>
+                    <a:solidFill>
+                      <a:schemeClr val="accent2">
+                        <a:lumMod val="40000"/>
+                        <a:lumOff val="60000"/>
+                      </a:schemeClr>
+                    </a:solidFill>
+                  </a:tcPr>
+                </a:tc>
+                <a:tc>
+                  <a:txBody>
+                    <a:bodyPr/>
+                    <a:lstStyle/>
+                    <a:p>
+                      <a:pPr marL="0" marR="0" lvl="0" indent="0" algn="l" defTabSz="914400" rtl="0" eaLnBrk="1" fontAlgn="auto" latinLnBrk="0" hangingPunct="1">
+                        <a:lnSpc>
+                          <a:spcPct val="100000"/>
+                        </a:lnSpc>
+                        <a:spcBef>
+                          <a:spcPts val="0"/>
+                        </a:spcBef>
+                        <a:spcAft>
+                          <a:spcPts val="0"/>
+                        </a:spcAft>
+                        <a:buClrTx/>
+                        <a:buSzTx/>
+                        <a:buFontTx/>
+                        <a:buNone/>
+                        <a:tabLst/>
+                        <a:defRPr/>
+                      </a:pPr>
+                      <a:r>
+                        <a:rPr lang="en-US" sz="1200" dirty="0"/>
+                        <a:t>(0,1)</a:t>
+                      </a:r>
+                    </a:p>
+                  </a:txBody>
+                  <a:tcPr>
+                    <a:lnB w="12700" cap="flat" cmpd="sng" algn="ctr">
+                      <a:solidFill>
+                        <a:schemeClr val="tx1"/>
+                      </a:solidFill>
+                      <a:prstDash val="solid"/>
+                      <a:round/>
+                      <a:headEnd type="none" w="med" len="med"/>
+                      <a:tailEnd type="none" w="med" len="med"/>
+                    </a:lnB>
+                    <a:solidFill>
+                      <a:schemeClr val="accent6">
+                        <a:lumMod val="40000"/>
+                        <a:lumOff val="60000"/>
+                      </a:schemeClr>
+                    </a:solidFill>
+                  </a:tcPr>
+                </a:tc>
+                <a:extLst>
+                  <a:ext uri="{0D108BD9-81ED-4DB2-BD59-A6C34878D82A}">
+                    <a16:rowId xmlns:a16="http://schemas.microsoft.com/office/drawing/2014/main" val="1340743427"/>
+                  </a:ext>
+                </a:extLst>
+              </a:tr>
+              <a:tr h="235846">
+                <a:tc>
+                  <a:txBody>
+                    <a:bodyPr/>
+                    <a:lstStyle/>
+                    <a:p>
+                      <a:r>
+                        <a:rPr lang="en-US" sz="1200" dirty="0"/>
+                        <a:t>(1,0)</a:t>
+                      </a:r>
+                    </a:p>
+                  </a:txBody>
+                  <a:tcPr>
+                    <a:lnR w="12700" cap="flat" cmpd="sng" algn="ctr">
+                      <a:solidFill>
+                        <a:schemeClr val="tx1"/>
+                      </a:solidFill>
+                      <a:prstDash val="solid"/>
+                      <a:round/>
+                      <a:headEnd type="none" w="med" len="med"/>
+                      <a:tailEnd type="none" w="med" len="med"/>
+                    </a:lnR>
+                    <a:solidFill>
+                      <a:schemeClr val="accent6">
+                        <a:lumMod val="40000"/>
+                        <a:lumOff val="60000"/>
+                      </a:schemeClr>
+                    </a:solidFill>
+                  </a:tcPr>
+                </a:tc>
+                <a:tc>
+                  <a:txBody>
+                    <a:bodyPr/>
+                    <a:lstStyle/>
+                    <a:p>
+                      <a:pPr marL="0" marR="0" lvl="0" indent="0" algn="l" defTabSz="914400" rtl="0" eaLnBrk="1" fontAlgn="auto" latinLnBrk="0" hangingPunct="1">
+                        <a:lnSpc>
+                          <a:spcPct val="100000"/>
+                        </a:lnSpc>
+                        <a:spcBef>
+                          <a:spcPts val="0"/>
+                        </a:spcBef>
+                        <a:spcAft>
+                          <a:spcPts val="0"/>
+                        </a:spcAft>
+                        <a:buClrTx/>
+                        <a:buSzTx/>
+                        <a:buFontTx/>
+                        <a:buNone/>
+                        <a:tabLst/>
+                        <a:defRPr/>
+                      </a:pPr>
+                      <a:r>
+                        <a:rPr lang="en-US" sz="1200" dirty="0"/>
+                        <a:t>(1,1)</a:t>
+                      </a:r>
+                    </a:p>
+                  </a:txBody>
+                  <a:tcPr>
+                    <a:lnL w="12700" cap="flat" cmpd="sng" algn="ctr">
+                      <a:solidFill>
+                        <a:schemeClr val="tx1"/>
+                      </a:solidFill>
+                      <a:prstDash val="solid"/>
+                      <a:round/>
+                      <a:headEnd type="none" w="med" len="med"/>
+                      <a:tailEnd type="none" w="med" len="med"/>
+                    </a:lnL>
+                    <a:lnR w="12700" cap="flat" cmpd="sng" algn="ctr">
+                      <a:solidFill>
+                        <a:schemeClr val="tx1"/>
+                      </a:solidFill>
+                      <a:prstDash val="solid"/>
+                      <a:round/>
+                      <a:headEnd type="none" w="med" len="med"/>
+                      <a:tailEnd type="none" w="med" len="med"/>
+                    </a:lnR>
+                    <a:lnT w="12700" cap="flat" cmpd="sng" algn="ctr">
+                      <a:solidFill>
+                        <a:schemeClr val="tx1"/>
+                      </a:solidFill>
+                      <a:prstDash val="solid"/>
+                      <a:round/>
+                      <a:headEnd type="none" w="med" len="med"/>
+                      <a:tailEnd type="none" w="med" len="med"/>
+                    </a:lnT>
+                    <a:lnB w="12700" cap="flat" cmpd="sng" algn="ctr">
+                      <a:solidFill>
+                        <a:schemeClr val="tx1"/>
+                      </a:solidFill>
+                      <a:prstDash val="solid"/>
+                      <a:round/>
+                      <a:headEnd type="none" w="med" len="med"/>
+                      <a:tailEnd type="none" w="med" len="med"/>
+                    </a:lnB>
+                    <a:solidFill>
+                      <a:schemeClr val="accent1">
+                        <a:lumMod val="40000"/>
+                        <a:lumOff val="60000"/>
+                      </a:schemeClr>
+                    </a:solidFill>
+                  </a:tcPr>
+                </a:tc>
+                <a:extLst>
+                  <a:ext uri="{0D108BD9-81ED-4DB2-BD59-A6C34878D82A}">
+                    <a16:rowId xmlns:a16="http://schemas.microsoft.com/office/drawing/2014/main" val="4081798692"/>
+                  </a:ext>
+                </a:extLst>
+              </a:tr>
+              <a:tr h="235846">
+                <a:tc>
+                  <a:txBody>
+                    <a:bodyPr/>
+                    <a:lstStyle/>
+                    <a:p>
+                      <a:r>
+                        <a:rPr lang="en-US" sz="1200" dirty="0"/>
+                        <a:t>(2,0)</a:t>
+                      </a:r>
+                    </a:p>
+                  </a:txBody>
+                  <a:tcPr>
+                    <a:solidFill>
+                      <a:schemeClr val="accent2">
+                        <a:lumMod val="40000"/>
+                        <a:lumOff val="60000"/>
+                      </a:schemeClr>
+                    </a:solidFill>
+                  </a:tcPr>
+                </a:tc>
+                <a:tc>
+                  <a:txBody>
+                    <a:bodyPr/>
+                    <a:lstStyle/>
+                    <a:p>
+                      <a:pPr marL="0" marR="0" lvl="0" indent="0" algn="l" defTabSz="914400" rtl="0" eaLnBrk="1" fontAlgn="auto" latinLnBrk="0" hangingPunct="1">
+                        <a:lnSpc>
+                          <a:spcPct val="100000"/>
+                        </a:lnSpc>
+                        <a:spcBef>
+                          <a:spcPts val="0"/>
+                        </a:spcBef>
+                        <a:spcAft>
+                          <a:spcPts val="0"/>
+                        </a:spcAft>
+                        <a:buClrTx/>
+                        <a:buSzTx/>
+                        <a:buFontTx/>
+                        <a:buNone/>
+                        <a:tabLst/>
+                        <a:defRPr/>
+                      </a:pPr>
+                      <a:r>
+                        <a:rPr lang="en-US" sz="1200" dirty="0"/>
+                        <a:t>(2,1)</a:t>
+                      </a:r>
+                    </a:p>
+                  </a:txBody>
+                  <a:tcPr>
+                    <a:lnT w="12700" cap="flat" cmpd="sng" algn="ctr">
+                      <a:solidFill>
+                        <a:schemeClr val="tx1"/>
+                      </a:solidFill>
+                      <a:prstDash val="solid"/>
+                      <a:round/>
+                      <a:headEnd type="none" w="med" len="med"/>
+                      <a:tailEnd type="none" w="med" len="med"/>
+                    </a:lnT>
+                    <a:solidFill>
+                      <a:schemeClr val="accent6">
+                        <a:lumMod val="40000"/>
+                        <a:lumOff val="60000"/>
+                      </a:schemeClr>
+                    </a:solidFill>
+                  </a:tcPr>
+                </a:tc>
+                <a:extLst>
+                  <a:ext uri="{0D108BD9-81ED-4DB2-BD59-A6C34878D82A}">
+                    <a16:rowId xmlns:a16="http://schemas.microsoft.com/office/drawing/2014/main" val="3517455808"/>
+                  </a:ext>
+                </a:extLst>
+              </a:tr>
+            </a:tbl>
+          </a:graphicData>
+        </a:graphic>
+      </p:graphicFrame>
+      <p:sp>
+        <p:nvSpPr>
+          <p:cNvPr id="35" name="文本框 34">
+            <a:extLst>
+              <a:ext uri="{FF2B5EF4-FFF2-40B4-BE49-F238E27FC236}">
+                <a16:creationId xmlns:a16="http://schemas.microsoft.com/office/drawing/2014/main" id="{5FFD6F6A-52FE-A522-8C3F-8546734FB08F}"/>
+              </a:ext>
+            </a:extLst>
+          </p:cNvPr>
+          <p:cNvSpPr txBox="1"/>
+          <p:nvPr/>
+        </p:nvSpPr>
+        <p:spPr>
+          <a:xfrm>
+            <a:off x="9479212" y="3198167"/>
+            <a:ext cx="752129" cy="461665"/>
+          </a:xfrm>
+          <a:prstGeom prst="rect">
+            <a:avLst/>
+          </a:prstGeom>
+          <a:noFill/>
+        </p:spPr>
+        <p:txBody>
+          <a:bodyPr wrap="none" rtlCol="0">
+            <a:spAutoFit/>
+          </a:bodyPr>
+          <a:lstStyle/>
+          <a:p>
+            <a:r>
+              <a:rPr lang="en-US" sz="2400" dirty="0"/>
+              <a:t>Grid</a:t>
+            </a:r>
+          </a:p>
+        </p:txBody>
+      </p:sp>
+      <p:sp>
+        <p:nvSpPr>
+          <p:cNvPr id="36" name="右大括号 35">
+            <a:extLst>
+              <a:ext uri="{FF2B5EF4-FFF2-40B4-BE49-F238E27FC236}">
+                <a16:creationId xmlns:a16="http://schemas.microsoft.com/office/drawing/2014/main" id="{A3897E16-01C0-0AB0-30B8-E0196D3BD8C5}"/>
+              </a:ext>
+            </a:extLst>
+          </p:cNvPr>
+          <p:cNvSpPr/>
+          <p:nvPr/>
+        </p:nvSpPr>
+        <p:spPr>
+          <a:xfrm rot="10800000">
+            <a:off x="9146116" y="1732785"/>
+            <a:ext cx="164882" cy="822962"/>
+          </a:xfrm>
+          <a:prstGeom prst="rightBrace">
+            <a:avLst>
+              <a:gd name="adj1" fmla="val 88333"/>
+              <a:gd name="adj2" fmla="val 50000"/>
+            </a:avLst>
+          </a:prstGeom>
+          <a:ln w="28575"/>
+        </p:spPr>
+        <p:style>
+          <a:lnRef idx="2">
+            <a:schemeClr val="dk1"/>
+          </a:lnRef>
+          <a:fillRef idx="0">
+            <a:schemeClr val="dk1"/>
+          </a:fillRef>
+          <a:effectRef idx="1">
+            <a:schemeClr val="dk1"/>
+          </a:effectRef>
+          <a:fontRef idx="minor">
+            <a:schemeClr val="tx1"/>
+          </a:fontRef>
+        </p:style>
+        <p:txBody>
+          <a:bodyPr rtlCol="0" anchor="ctr"/>
+          <a:lstStyle/>
+          <a:p>
+            <a:pPr algn="ctr"/>
+            <a:endParaRPr lang="en-US"/>
+          </a:p>
+        </p:txBody>
+      </p:sp>
+      <p:sp>
+        <p:nvSpPr>
+          <p:cNvPr id="37" name="文本框 36">
+            <a:extLst>
+              <a:ext uri="{FF2B5EF4-FFF2-40B4-BE49-F238E27FC236}">
+                <a16:creationId xmlns:a16="http://schemas.microsoft.com/office/drawing/2014/main" id="{7BF1DAE2-8299-B93E-F56F-024963F8F419}"/>
+              </a:ext>
+            </a:extLst>
+          </p:cNvPr>
+          <p:cNvSpPr txBox="1"/>
+          <p:nvPr/>
+        </p:nvSpPr>
+        <p:spPr>
+          <a:xfrm>
+            <a:off x="8036783" y="1959600"/>
+            <a:ext cx="1136850" cy="369332"/>
+          </a:xfrm>
+          <a:prstGeom prst="rect">
+            <a:avLst/>
+          </a:prstGeom>
+          <a:noFill/>
+        </p:spPr>
+        <p:txBody>
+          <a:bodyPr wrap="none" rtlCol="0">
+            <a:spAutoFit/>
+          </a:bodyPr>
+          <a:lstStyle/>
+          <a:p>
+            <a:r>
+              <a:rPr lang="en-US" dirty="0"/>
+              <a:t>gridDim.x</a:t>
+            </a:r>
+          </a:p>
+        </p:txBody>
+      </p:sp>
+      <p:sp>
+        <p:nvSpPr>
+          <p:cNvPr id="38" name="文本框 37">
+            <a:extLst>
+              <a:ext uri="{FF2B5EF4-FFF2-40B4-BE49-F238E27FC236}">
+                <a16:creationId xmlns:a16="http://schemas.microsoft.com/office/drawing/2014/main" id="{2D2D3C44-9799-8CD6-E8E8-6D120DD89916}"/>
+              </a:ext>
+            </a:extLst>
+          </p:cNvPr>
+          <p:cNvSpPr txBox="1"/>
+          <p:nvPr/>
+        </p:nvSpPr>
+        <p:spPr>
+          <a:xfrm>
+            <a:off x="9337708" y="1146152"/>
+            <a:ext cx="1121654" cy="369332"/>
+          </a:xfrm>
+          <a:prstGeom prst="rect">
+            <a:avLst/>
+          </a:prstGeom>
+          <a:noFill/>
+        </p:spPr>
+        <p:txBody>
+          <a:bodyPr wrap="none" rtlCol="0">
+            <a:spAutoFit/>
+          </a:bodyPr>
+          <a:lstStyle/>
+          <a:p>
+            <a:r>
+              <a:rPr lang="en-US" dirty="0"/>
+              <a:t>gridDim.y</a:t>
+            </a:r>
+          </a:p>
+        </p:txBody>
+      </p:sp>
+      <p:sp>
+        <p:nvSpPr>
+          <p:cNvPr id="39" name="右大括号 38">
+            <a:extLst>
+              <a:ext uri="{FF2B5EF4-FFF2-40B4-BE49-F238E27FC236}">
+                <a16:creationId xmlns:a16="http://schemas.microsoft.com/office/drawing/2014/main" id="{4264BE2B-ECAA-0C3F-F320-55CBDC15DB4A}"/>
+              </a:ext>
+            </a:extLst>
+          </p:cNvPr>
+          <p:cNvSpPr/>
+          <p:nvPr/>
+        </p:nvSpPr>
+        <p:spPr>
+          <a:xfrm rot="16200000">
+            <a:off x="9785149" y="1084668"/>
+            <a:ext cx="164882" cy="1007837"/>
+          </a:xfrm>
+          <a:prstGeom prst="rightBrace">
+            <a:avLst>
+              <a:gd name="adj1" fmla="val 88333"/>
+              <a:gd name="adj2" fmla="val 50000"/>
+            </a:avLst>
+          </a:prstGeom>
+          <a:ln w="28575"/>
+        </p:spPr>
+        <p:style>
+          <a:lnRef idx="2">
+            <a:schemeClr val="dk1"/>
+          </a:lnRef>
+          <a:fillRef idx="0">
+            <a:schemeClr val="dk1"/>
+          </a:fillRef>
+          <a:effectRef idx="1">
+            <a:schemeClr val="dk1"/>
+          </a:effectRef>
+          <a:fontRef idx="minor">
+            <a:schemeClr val="tx1"/>
+          </a:fontRef>
+        </p:style>
+        <p:txBody>
+          <a:bodyPr rtlCol="0" anchor="ctr"/>
+          <a:lstStyle/>
+          <a:p>
+            <a:pPr algn="ctr"/>
+            <a:endParaRPr lang="en-US"/>
+          </a:p>
+        </p:txBody>
+      </p:sp>
+    </p:spTree>
+    <p:extLst>
+      <p:ext uri="{BB962C8B-B14F-4D97-AF65-F5344CB8AC3E}">
+        <p14:creationId xmlns:p14="http://schemas.microsoft.com/office/powerpoint/2010/main" val="1674196668"/>
       </p:ext>
     </p:extLst>
   </p:cSld>

</xml_diff>

<commit_message>
[cute_tma] fix bug in figure
</commit_message>
<xml_diff>
--- a/blogs/cute_tma/figures.pptx
+++ b/blogs/cute_tma/figures.pptx
@@ -266,7 +266,7 @@
           <a:p>
             <a:fld id="{89170DA2-E98C-46C7-8CBA-4D919B2F7647}" type="datetimeFigureOut">
               <a:rPr lang="en-US" smtClean="0"/>
-              <a:t>12/3/2024</a:t>
+              <a:t>12/15/2024</a:t>
             </a:fld>
             <a:endParaRPr lang="en-US"/>
           </a:p>
@@ -466,7 +466,7 @@
           <a:p>
             <a:fld id="{89170DA2-E98C-46C7-8CBA-4D919B2F7647}" type="datetimeFigureOut">
               <a:rPr lang="en-US" smtClean="0"/>
-              <a:t>12/3/2024</a:t>
+              <a:t>12/15/2024</a:t>
             </a:fld>
             <a:endParaRPr lang="en-US"/>
           </a:p>
@@ -676,7 +676,7 @@
           <a:p>
             <a:fld id="{89170DA2-E98C-46C7-8CBA-4D919B2F7647}" type="datetimeFigureOut">
               <a:rPr lang="en-US" smtClean="0"/>
-              <a:t>12/3/2024</a:t>
+              <a:t>12/15/2024</a:t>
             </a:fld>
             <a:endParaRPr lang="en-US"/>
           </a:p>
@@ -876,7 +876,7 @@
           <a:p>
             <a:fld id="{89170DA2-E98C-46C7-8CBA-4D919B2F7647}" type="datetimeFigureOut">
               <a:rPr lang="en-US" smtClean="0"/>
-              <a:t>12/3/2024</a:t>
+              <a:t>12/15/2024</a:t>
             </a:fld>
             <a:endParaRPr lang="en-US"/>
           </a:p>
@@ -1152,7 +1152,7 @@
           <a:p>
             <a:fld id="{89170DA2-E98C-46C7-8CBA-4D919B2F7647}" type="datetimeFigureOut">
               <a:rPr lang="en-US" smtClean="0"/>
-              <a:t>12/3/2024</a:t>
+              <a:t>12/15/2024</a:t>
             </a:fld>
             <a:endParaRPr lang="en-US"/>
           </a:p>
@@ -1420,7 +1420,7 @@
           <a:p>
             <a:fld id="{89170DA2-E98C-46C7-8CBA-4D919B2F7647}" type="datetimeFigureOut">
               <a:rPr lang="en-US" smtClean="0"/>
-              <a:t>12/3/2024</a:t>
+              <a:t>12/15/2024</a:t>
             </a:fld>
             <a:endParaRPr lang="en-US"/>
           </a:p>
@@ -1835,7 +1835,7 @@
           <a:p>
             <a:fld id="{89170DA2-E98C-46C7-8CBA-4D919B2F7647}" type="datetimeFigureOut">
               <a:rPr lang="en-US" smtClean="0"/>
-              <a:t>12/3/2024</a:t>
+              <a:t>12/15/2024</a:t>
             </a:fld>
             <a:endParaRPr lang="en-US"/>
           </a:p>
@@ -1977,7 +1977,7 @@
           <a:p>
             <a:fld id="{89170DA2-E98C-46C7-8CBA-4D919B2F7647}" type="datetimeFigureOut">
               <a:rPr lang="en-US" smtClean="0"/>
-              <a:t>12/3/2024</a:t>
+              <a:t>12/15/2024</a:t>
             </a:fld>
             <a:endParaRPr lang="en-US"/>
           </a:p>
@@ -2090,7 +2090,7 @@
           <a:p>
             <a:fld id="{89170DA2-E98C-46C7-8CBA-4D919B2F7647}" type="datetimeFigureOut">
               <a:rPr lang="en-US" smtClean="0"/>
-              <a:t>12/3/2024</a:t>
+              <a:t>12/15/2024</a:t>
             </a:fld>
             <a:endParaRPr lang="en-US"/>
           </a:p>
@@ -2403,7 +2403,7 @@
           <a:p>
             <a:fld id="{89170DA2-E98C-46C7-8CBA-4D919B2F7647}" type="datetimeFigureOut">
               <a:rPr lang="en-US" smtClean="0"/>
-              <a:t>12/3/2024</a:t>
+              <a:t>12/15/2024</a:t>
             </a:fld>
             <a:endParaRPr lang="en-US"/>
           </a:p>
@@ -2692,7 +2692,7 @@
           <a:p>
             <a:fld id="{89170DA2-E98C-46C7-8CBA-4D919B2F7647}" type="datetimeFigureOut">
               <a:rPr lang="en-US" smtClean="0"/>
-              <a:t>12/3/2024</a:t>
+              <a:t>12/15/2024</a:t>
             </a:fld>
             <a:endParaRPr lang="en-US"/>
           </a:p>
@@ -2935,7 +2935,7 @@
           <a:p>
             <a:fld id="{89170DA2-E98C-46C7-8CBA-4D919B2F7647}" type="datetimeFigureOut">
               <a:rPr lang="en-US" smtClean="0"/>
-              <a:t>12/3/2024</a:t>
+              <a:t>12/15/2024</a:t>
             </a:fld>
             <a:endParaRPr lang="en-US"/>
           </a:p>
@@ -12424,7 +12424,7 @@
           <p:nvPr>
             <p:extLst>
               <p:ext uri="{D42A27DB-BD31-4B8C-83A1-F6EECF244321}">
-                <p14:modId xmlns:p14="http://schemas.microsoft.com/office/powerpoint/2010/main" val="1527613486"/>
+                <p14:modId xmlns:p14="http://schemas.microsoft.com/office/powerpoint/2010/main" val="4047537168"/>
               </p:ext>
             </p:extLst>
           </p:nvPr>
@@ -12461,7 +12461,10 @@
                     <a:bodyPr/>
                     <a:lstStyle/>
                     <a:p>
-                      <a:endParaRPr lang="en-US" dirty="0"/>
+                      <a:r>
+                        <a:rPr lang="en-US" dirty="0"/>
+                        <a:t>0</a:t>
+                      </a:r>
                     </a:p>
                   </a:txBody>
                   <a:tcPr>
@@ -12487,7 +12490,10 @@
                     <a:bodyPr/>
                     <a:lstStyle/>
                     <a:p>
-                      <a:endParaRPr lang="en-US" dirty="0"/>
+                      <a:r>
+                        <a:rPr lang="en-US" dirty="0"/>
+                        <a:t>1</a:t>
+                      </a:r>
                     </a:p>
                   </a:txBody>
                   <a:tcPr>
@@ -12616,7 +12622,7 @@
         <p:spPr>
           <a:xfrm>
             <a:off x="2419906" y="2684023"/>
-            <a:ext cx="1383520" cy="369332"/>
+            <a:ext cx="1351460" cy="369332"/>
           </a:xfrm>
           <a:prstGeom prst="rect">
             <a:avLst/>
@@ -12631,7 +12637,7 @@
           <a:p>
             <a:r>
               <a:rPr lang="en-US" dirty="0"/>
-              <a:t>CLUSTER_N</a:t>
+              <a:t>CLUSTER_K</a:t>
             </a:r>
           </a:p>
         </p:txBody>
@@ -12699,7 +12705,7 @@
         <p:spPr>
           <a:xfrm>
             <a:off x="3742078" y="2127325"/>
-            <a:ext cx="1351460" cy="369332"/>
+            <a:ext cx="1383520" cy="369332"/>
           </a:xfrm>
           <a:prstGeom prst="rect">
             <a:avLst/>
@@ -12714,7 +12720,7 @@
           <a:p>
             <a:r>
               <a:rPr lang="en-US" dirty="0"/>
-              <a:t>CLUSTER_K</a:t>
+              <a:t>CLUSTER_N</a:t>
             </a:r>
           </a:p>
         </p:txBody>
@@ -12869,7 +12875,7 @@
         <p:spPr>
           <a:xfrm>
             <a:off x="8513904" y="2878713"/>
-            <a:ext cx="1343188" cy="369332"/>
+            <a:ext cx="2562433" cy="369332"/>
           </a:xfrm>
           <a:prstGeom prst="rect">
             <a:avLst/>
@@ -12884,7 +12890,7 @@
           <a:p>
             <a:r>
               <a:rPr lang="en-US" dirty="0"/>
-              <a:t>Copy_Atom</a:t>
+              <a:t>ThrCopy = 1 Copy_Atom</a:t>
             </a:r>
           </a:p>
         </p:txBody>
@@ -13680,7 +13686,7 @@
           <p:nvPr>
             <p:extLst>
               <p:ext uri="{D42A27DB-BD31-4B8C-83A1-F6EECF244321}">
-                <p14:modId xmlns:p14="http://schemas.microsoft.com/office/powerpoint/2010/main" val="4150067852"/>
+                <p14:modId xmlns:p14="http://schemas.microsoft.com/office/powerpoint/2010/main" val="4100235655"/>
               </p:ext>
             </p:extLst>
           </p:nvPr>
@@ -13717,7 +13723,10 @@
                     <a:bodyPr/>
                     <a:lstStyle/>
                     <a:p>
-                      <a:endParaRPr lang="en-US" dirty="0"/>
+                      <a:r>
+                        <a:rPr lang="en-US" dirty="0"/>
+                        <a:t>0</a:t>
+                      </a:r>
                     </a:p>
                   </a:txBody>
                   <a:tcPr>
@@ -13734,7 +13743,10 @@
                     <a:bodyPr/>
                     <a:lstStyle/>
                     <a:p>
-                      <a:endParaRPr lang="en-US" dirty="0"/>
+                      <a:r>
+                        <a:rPr lang="en-US" dirty="0"/>
+                        <a:t>2</a:t>
+                      </a:r>
                     </a:p>
                   </a:txBody>
                   <a:tcPr>
@@ -13758,7 +13770,10 @@
                     <a:bodyPr/>
                     <a:lstStyle/>
                     <a:p>
-                      <a:endParaRPr lang="en-US" dirty="0"/>
+                      <a:r>
+                        <a:rPr lang="en-US" dirty="0"/>
+                        <a:t>1</a:t>
+                      </a:r>
                     </a:p>
                   </a:txBody>
                   <a:tcPr>
@@ -13784,7 +13799,10 @@
                     <a:bodyPr/>
                     <a:lstStyle/>
                     <a:p>
-                      <a:endParaRPr lang="en-US" dirty="0"/>
+                      <a:r>
+                        <a:rPr lang="en-US" dirty="0"/>
+                        <a:t>3</a:t>
+                      </a:r>
                     </a:p>
                   </a:txBody>
                   <a:tcPr>
@@ -13912,7 +13930,7 @@
         <p:spPr>
           <a:xfrm>
             <a:off x="2419906" y="3063379"/>
-            <a:ext cx="1383520" cy="369332"/>
+            <a:ext cx="1351460" cy="369332"/>
           </a:xfrm>
           <a:prstGeom prst="rect">
             <a:avLst/>
@@ -13927,7 +13945,7 @@
           <a:p>
             <a:r>
               <a:rPr lang="en-US" dirty="0"/>
-              <a:t>CLUSTER_N</a:t>
+              <a:t>CLUSTER_K</a:t>
             </a:r>
           </a:p>
         </p:txBody>
@@ -13995,7 +14013,7 @@
         <p:spPr>
           <a:xfrm>
             <a:off x="3742078" y="2127325"/>
-            <a:ext cx="1351460" cy="369332"/>
+            <a:ext cx="1383520" cy="369332"/>
           </a:xfrm>
           <a:prstGeom prst="rect">
             <a:avLst/>
@@ -14010,7 +14028,7 @@
           <a:p>
             <a:r>
               <a:rPr lang="en-US" dirty="0"/>
-              <a:t>CLUSTER_K</a:t>
+              <a:t>CLUSTER_N</a:t>
             </a:r>
           </a:p>
         </p:txBody>
@@ -14165,7 +14183,7 @@
         <p:spPr>
           <a:xfrm>
             <a:off x="8513904" y="2878713"/>
-            <a:ext cx="1343188" cy="369332"/>
+            <a:ext cx="2562433" cy="369332"/>
           </a:xfrm>
           <a:prstGeom prst="rect">
             <a:avLst/>
@@ -14180,7 +14198,7 @@
           <a:p>
             <a:r>
               <a:rPr lang="en-US" dirty="0"/>
-              <a:t>Copy_Atom</a:t>
+              <a:t>ThrCopy = 1 Copy_Atom</a:t>
             </a:r>
           </a:p>
         </p:txBody>

</xml_diff>